<commit_message>
- LS, AB, S7, MX : CVS 통한 tag 정보 읽기 작업 중..
</commit_message>
<xml_diff>
--- a/src/misc/Plc2DS/PLC 역변환기.pptx
+++ b/src/misc/Plc2DS/PLC 역변환기.pptx
@@ -5,7 +5,7 @@
     <p:sldMasterId id="2147483648" r:id="rId1"/>
   </p:sldMasterIdLst>
   <p:notesMasterIdLst>
-    <p:notesMasterId r:id="rId15"/>
+    <p:notesMasterId r:id="rId16"/>
   </p:notesMasterIdLst>
   <p:sldIdLst>
     <p:sldId id="256" r:id="rId2"/>
@@ -15,17 +15,18 @@
     <p:sldId id="260" r:id="rId6"/>
     <p:sldId id="261" r:id="rId7"/>
     <p:sldId id="262" r:id="rId8"/>
-    <p:sldId id="264" r:id="rId9"/>
-    <p:sldId id="265" r:id="rId10"/>
-    <p:sldId id="268" r:id="rId11"/>
-    <p:sldId id="263" r:id="rId12"/>
-    <p:sldId id="266" r:id="rId13"/>
-    <p:sldId id="267" r:id="rId14"/>
+    <p:sldId id="269" r:id="rId9"/>
+    <p:sldId id="264" r:id="rId10"/>
+    <p:sldId id="265" r:id="rId11"/>
+    <p:sldId id="268" r:id="rId12"/>
+    <p:sldId id="263" r:id="rId13"/>
+    <p:sldId id="266" r:id="rId14"/>
+    <p:sldId id="267" r:id="rId15"/>
   </p:sldIdLst>
   <p:sldSz cx="12192000" cy="6858000"/>
   <p:notesSz cx="6858000" cy="9144000"/>
   <p:custDataLst>
-    <p:tags r:id="rId16"/>
+    <p:tags r:id="rId17"/>
   </p:custDataLst>
   <p:defaultTextStyle>
     <a:defPPr>
@@ -590,7 +591,7 @@
           <a:p>
             <a:fld id="{F767733E-66BF-402F-AA13-4469DBD83F54}" type="slidenum">
               <a:rPr lang="ko-KR" altLang="en-US" smtClean="0"/>
-              <a:t>9</a:t>
+              <a:t>10</a:t>
             </a:fld>
             <a:endParaRPr lang="ko-KR" altLang="en-US"/>
           </a:p>
@@ -3926,7 +3927,7 @@
           <p:cNvPr id="2" name="제목 1">
             <a:extLst>
               <a:ext uri="{FF2B5EF4-FFF2-40B4-BE49-F238E27FC236}">
-                <a16:creationId xmlns:a16="http://schemas.microsoft.com/office/drawing/2014/main" id="{014A300F-C093-E30C-1276-52287B031619}"/>
+                <a16:creationId xmlns:a16="http://schemas.microsoft.com/office/drawing/2014/main" id="{D02F4BC7-B151-78FA-57B6-099E8C5A4D5D}"/>
               </a:ext>
             </a:extLst>
           </p:cNvPr>
@@ -3955,7 +3956,7 @@
           <p:cNvPr id="3" name="내용 개체 틀 2">
             <a:extLst>
               <a:ext uri="{FF2B5EF4-FFF2-40B4-BE49-F238E27FC236}">
-                <a16:creationId xmlns:a16="http://schemas.microsoft.com/office/drawing/2014/main" id="{64286BFC-0D62-8DFD-E7AC-2578B7EE3238}"/>
+                <a16:creationId xmlns:a16="http://schemas.microsoft.com/office/drawing/2014/main" id="{99A31B4C-85A9-B7B5-F302-759A681EB5AC}"/>
               </a:ext>
             </a:extLst>
           </p:cNvPr>
@@ -3966,79 +3967,312 @@
             <p:ph idx="1"/>
           </p:nvPr>
         </p:nvSpPr>
-        <p:spPr/>
+        <p:spPr>
+          <a:xfrm>
+            <a:off x="5754848" y="1825625"/>
+            <a:ext cx="5598952" cy="4351338"/>
+          </a:xfrm>
+        </p:spPr>
         <p:txBody>
           <a:bodyPr/>
           <a:lstStyle/>
           <a:p>
             <a:r>
-              <a:rPr lang="en-US" altLang="ko-KR" dirty="0" err="1"/>
-              <a:t>EucKR</a:t>
-            </a:r>
-            <a:endParaRPr lang="en-US" altLang="ko-KR" dirty="0"/>
-          </a:p>
-          <a:p>
-            <a:r>
               <a:rPr lang="en-US" altLang="ko-KR" dirty="0"/>
-              <a:t>Parser </a:t>
-            </a:r>
+              <a:t>DATA_BLOCK*</a:t>
+            </a:r>
+          </a:p>
+          <a:p>
+            <a:pPr lvl="1"/>
+            <a:r>
+              <a:rPr lang="en-US" altLang="ko-KR" dirty="0"/>
+              <a:t>STRUCT (recursive)</a:t>
+            </a:r>
+          </a:p>
+          <a:p>
+            <a:pPr lvl="1"/>
+            <a:r>
+              <a:rPr lang="en-US" altLang="ko-KR" dirty="0"/>
+              <a:t>BEGIN</a:t>
+            </a:r>
+          </a:p>
+          <a:p>
+            <a:r>
+              <a:rPr lang="en-US" altLang="ko-KR" dirty="0"/>
+              <a:t>ORGANIZATION_BLOCK*</a:t>
+            </a:r>
+          </a:p>
+          <a:p>
+            <a:pPr lvl="1"/>
+            <a:r>
+              <a:rPr lang="en-US" altLang="ko-KR" dirty="0"/>
+              <a:t>VAR_TEMP</a:t>
+            </a:r>
+          </a:p>
+          <a:p>
+            <a:pPr lvl="1"/>
+            <a:r>
+              <a:rPr lang="en-US" altLang="ko-KR" dirty="0"/>
+              <a:t>BEGIN</a:t>
+            </a:r>
+          </a:p>
+          <a:p>
+            <a:pPr lvl="1"/>
+            <a:r>
+              <a:rPr lang="en-US" altLang="ko-KR" dirty="0"/>
+              <a:t>NETWORK*</a:t>
+            </a:r>
+          </a:p>
+          <a:p>
+            <a:r>
+              <a:rPr lang="en-US" altLang="ko-KR" dirty="0"/>
+              <a:t>END_ORGANIZATION_BLOCK</a:t>
+            </a:r>
+            <a:endParaRPr lang="ko-KR" altLang="en-US" dirty="0"/>
+          </a:p>
+        </p:txBody>
+      </p:sp>
+      <p:sp>
+        <p:nvSpPr>
+          <p:cNvPr id="5" name="TextBox 4">
+            <a:extLst>
+              <a:ext uri="{FF2B5EF4-FFF2-40B4-BE49-F238E27FC236}">
+                <a16:creationId xmlns:a16="http://schemas.microsoft.com/office/drawing/2014/main" id="{C96FAB11-F64F-BED8-19E0-B2073F72A9B5}"/>
+              </a:ext>
+            </a:extLst>
+          </p:cNvPr>
+          <p:cNvSpPr txBox="1"/>
+          <p:nvPr/>
+        </p:nvSpPr>
+        <p:spPr>
+          <a:xfrm>
+            <a:off x="838200" y="1341795"/>
+            <a:ext cx="2811011" cy="4862870"/>
+          </a:xfrm>
+          <a:prstGeom prst="rect">
+            <a:avLst/>
+          </a:prstGeom>
+          <a:noFill/>
+        </p:spPr>
+        <p:txBody>
+          <a:bodyPr wrap="square">
+            <a:spAutoFit/>
+          </a:bodyPr>
+          <a:lstStyle/>
+          <a:p>
+            <a:r>
+              <a:rPr lang="en-US" altLang="ko-KR" sz="1000" dirty="0"/>
+              <a:t>DATA_BLOCK DB 1</a:t>
+            </a:r>
+          </a:p>
+          <a:p>
+            <a:r>
+              <a:rPr lang="en-US" altLang="ko-KR" sz="1000" dirty="0"/>
+              <a:t>TITLE =</a:t>
+            </a:r>
+          </a:p>
+          <a:p>
+            <a:r>
+              <a:rPr lang="en-US" altLang="ko-KR" sz="1000" dirty="0"/>
+              <a:t>VERSION : 0.1</a:t>
+            </a:r>
+          </a:p>
+          <a:p>
+            <a:endParaRPr lang="en-US" altLang="ko-KR" sz="1000" dirty="0"/>
+          </a:p>
+          <a:p>
+            <a:endParaRPr lang="en-US" altLang="ko-KR" sz="1000" dirty="0"/>
+          </a:p>
+          <a:p>
+            <a:r>
+              <a:rPr lang="en-US" altLang="ko-KR" sz="1000" dirty="0"/>
+              <a:t>  STRUCT 	</a:t>
+            </a:r>
+          </a:p>
+          <a:p>
+            <a:r>
+              <a:rPr lang="en-US" altLang="ko-KR" sz="1000" dirty="0"/>
+              <a:t>   BUFF : STRUCT 	//Temporary</a:t>
+            </a:r>
+          </a:p>
+          <a:p>
+            <a:r>
+              <a:rPr lang="en-US" altLang="ko-KR" sz="1000" dirty="0"/>
+              <a:t>    CAR_TYPE : WORD ;	</a:t>
+            </a:r>
+          </a:p>
+          <a:p>
+            <a:r>
+              <a:rPr lang="en-US" altLang="ko-KR" sz="1000" dirty="0"/>
+              <a:t>    C_NO : WORD ;	</a:t>
+            </a:r>
+          </a:p>
+          <a:p>
+            <a:r>
+              <a:rPr lang="en-US" altLang="ko-KR" sz="1000" dirty="0"/>
+              <a:t>    ROBOT : WORD ;	</a:t>
+            </a:r>
+          </a:p>
+          <a:p>
+            <a:r>
+              <a:rPr lang="en-US" altLang="ko-KR" sz="1000" dirty="0"/>
+              <a:t>    PROFILE : WORD ;	</a:t>
+            </a:r>
+          </a:p>
+          <a:p>
+            <a:r>
+              <a:rPr lang="en-US" altLang="ko-KR" sz="1000" dirty="0"/>
+              <a:t>    VIN_1 : WORD ;	</a:t>
+            </a:r>
+          </a:p>
+          <a:p>
+            <a:r>
+              <a:rPr lang="en-US" altLang="ko-KR" sz="1000" dirty="0"/>
+              <a:t>    VIN_2 : WORD ;	</a:t>
+            </a:r>
+          </a:p>
+          <a:p>
+            <a:r>
+              <a:rPr lang="en-US" altLang="ko-KR" sz="1000" dirty="0"/>
+              <a:t>    VIN_3 : WORD ;	</a:t>
+            </a:r>
+          </a:p>
+          <a:p>
+            <a:r>
+              <a:rPr lang="en-US" altLang="ko-KR" sz="1000" dirty="0"/>
+              <a:t>    VIN_4 : WORD ;	</a:t>
+            </a:r>
+          </a:p>
+          <a:p>
+            <a:r>
+              <a:rPr lang="en-US" altLang="ko-KR" sz="1000" dirty="0"/>
+              <a:t>    VIN_5 : WORD ;	</a:t>
+            </a:r>
+          </a:p>
+          <a:p>
+            <a:r>
+              <a:rPr lang="en-US" altLang="ko-KR" sz="1000" dirty="0"/>
+              <a:t>    VIN_6 : WORD ;	</a:t>
+            </a:r>
+          </a:p>
+          <a:p>
+            <a:r>
+              <a:rPr lang="en-US" altLang="ko-KR" sz="1000" dirty="0"/>
+              <a:t>   END_STRUCT ;	</a:t>
+            </a:r>
+          </a:p>
+          <a:p>
+            <a:r>
+              <a:rPr lang="en-US" altLang="ko-KR" sz="1000" dirty="0"/>
+              <a:t>   S171 : STRUCT 	//Temporary</a:t>
+            </a:r>
+          </a:p>
+          <a:p>
+            <a:r>
+              <a:rPr lang="en-US" altLang="ko-KR" sz="1000" dirty="0"/>
+              <a:t>    CAR_TYPE : WORD ;	</a:t>
+            </a:r>
+          </a:p>
+          <a:p>
+            <a:r>
+              <a:rPr lang="en-US" altLang="ko-KR" sz="1000" dirty="0"/>
+              <a:t>    C_NO : WORD ;	</a:t>
+            </a:r>
+          </a:p>
+          <a:p>
+            <a:r>
+              <a:rPr lang="en-US" altLang="ko-KR" sz="1000" dirty="0"/>
+              <a:t>    ROBOT : WORD ;	</a:t>
+            </a:r>
+          </a:p>
+          <a:p>
+            <a:r>
+              <a:rPr lang="en-US" altLang="ko-KR" sz="1000" dirty="0"/>
+              <a:t>    PROFILE : WORD ;	</a:t>
+            </a:r>
+          </a:p>
+          <a:p>
+            <a:r>
+              <a:rPr lang="en-US" altLang="ko-KR" sz="1000" dirty="0"/>
+              <a:t>    VIN_1 : WORD ;	</a:t>
+            </a:r>
+          </a:p>
+          <a:p>
+            <a:r>
+              <a:rPr lang="en-US" altLang="ko-KR" sz="1000" dirty="0"/>
+              <a:t>    VIN_2 : WORD ;	</a:t>
+            </a:r>
+          </a:p>
+          <a:p>
+            <a:r>
+              <a:rPr lang="en-US" altLang="ko-KR" sz="1000" dirty="0"/>
+              <a:t>    VIN_3 : WORD ;	</a:t>
+            </a:r>
+          </a:p>
+          <a:p>
+            <a:r>
+              <a:rPr lang="en-US" altLang="ko-KR" sz="1000" dirty="0"/>
+              <a:t>    VIN_4 : WORD ;	</a:t>
+            </a:r>
+          </a:p>
+          <a:p>
+            <a:r>
+              <a:rPr lang="en-US" altLang="ko-KR" sz="1000" dirty="0"/>
+              <a:t>    VIN_5 : WORD ;	</a:t>
+            </a:r>
+          </a:p>
+          <a:p>
+            <a:r>
+              <a:rPr lang="en-US" altLang="ko-KR" sz="1000" dirty="0"/>
+              <a:t>    VIN_6 : WORD ;	</a:t>
+            </a:r>
+          </a:p>
+          <a:p>
+            <a:r>
+              <a:rPr lang="en-US" altLang="ko-KR" sz="1000" dirty="0"/>
+              <a:t>   END_STRUCT ;	</a:t>
+            </a:r>
+          </a:p>
+          <a:p>
+            <a:r>
+              <a:rPr lang="en-US" altLang="ko-KR" sz="1000" dirty="0"/>
+              <a:t> </a:t>
+            </a:r>
+            <a:endParaRPr lang="ko-KR" altLang="en-US" sz="1000" dirty="0"/>
+          </a:p>
+        </p:txBody>
+      </p:sp>
+      <p:sp>
+        <p:nvSpPr>
+          <p:cNvPr id="7" name="TextBox 6">
+            <a:extLst>
+              <a:ext uri="{FF2B5EF4-FFF2-40B4-BE49-F238E27FC236}">
+                <a16:creationId xmlns:a16="http://schemas.microsoft.com/office/drawing/2014/main" id="{DA9945B1-50D5-1D85-8EBA-AFA1B3B531F8}"/>
+              </a:ext>
+            </a:extLst>
+          </p:cNvPr>
+          <p:cNvSpPr txBox="1"/>
+          <p:nvPr/>
+        </p:nvSpPr>
+        <p:spPr>
+          <a:xfrm>
+            <a:off x="492632" y="6311900"/>
+            <a:ext cx="9456039" cy="369332"/>
+          </a:xfrm>
+          <a:prstGeom prst="rect">
+            <a:avLst/>
+          </a:prstGeom>
+          <a:noFill/>
+        </p:spPr>
+        <p:txBody>
+          <a:bodyPr wrap="square">
+            <a:spAutoFit/>
+          </a:bodyPr>
+          <a:lstStyle/>
+          <a:p>
             <a:r>
               <a:rPr lang="ko-KR" altLang="en-US" dirty="0"/>
-              <a:t>부적합</a:t>
-            </a:r>
-            <a:r>
-              <a:rPr lang="en-US" altLang="ko-KR" dirty="0"/>
-              <a:t>.  </a:t>
-            </a:r>
-          </a:p>
-          <a:p>
-            <a:pPr lvl="1"/>
-            <a:r>
-              <a:rPr lang="en-US" altLang="ko-KR" dirty="0"/>
-              <a:t>Raw text read &amp; parse</a:t>
-            </a:r>
-          </a:p>
-          <a:p>
-            <a:pPr lvl="1"/>
-            <a:r>
-              <a:rPr lang="ko-KR" altLang="en-US" dirty="0"/>
-              <a:t>시작 </a:t>
-            </a:r>
-            <a:r>
-              <a:rPr lang="en-US" altLang="ko-KR" dirty="0"/>
-              <a:t>Indent, </a:t>
-            </a:r>
-            <a:r>
-              <a:rPr lang="ko-KR" altLang="en-US" dirty="0"/>
-              <a:t>종료 </a:t>
-            </a:r>
-            <a:r>
-              <a:rPr lang="en-US" altLang="ko-KR" dirty="0"/>
-              <a:t>‘;’ </a:t>
-            </a:r>
-            <a:r>
-              <a:rPr lang="ko-KR" altLang="en-US" dirty="0"/>
-              <a:t>중요</a:t>
-            </a:r>
-            <a:endParaRPr lang="en-US" altLang="ko-KR" dirty="0"/>
-          </a:p>
-          <a:p>
-            <a:pPr lvl="1"/>
-            <a:r>
-              <a:rPr lang="en-US" altLang="ko-KR" dirty="0"/>
-              <a:t>// </a:t>
-            </a:r>
-            <a:r>
-              <a:rPr lang="ko-KR" altLang="en-US" dirty="0"/>
-              <a:t>부터 라인 끝까지는 사용자 </a:t>
-            </a:r>
-            <a:r>
-              <a:rPr lang="en-US" altLang="ko-KR" dirty="0"/>
-              <a:t>comment </a:t>
-            </a:r>
-            <a:r>
-              <a:rPr lang="ko-KR" altLang="en-US" dirty="0"/>
-              <a:t>로 해석</a:t>
+              <a:t>https://cache.industry.siemens.com/dl/files/446/45523446/att_79269/v1/s7awl__b.pdf</a:t>
             </a:r>
           </a:p>
         </p:txBody>
@@ -4049,7 +4283,7 @@
     </p:custDataLst>
     <p:extLst>
       <p:ext uri="{BB962C8B-B14F-4D97-AF65-F5344CB8AC3E}">
-        <p14:creationId xmlns:p14="http://schemas.microsoft.com/office/powerpoint/2010/main" val="1420040040"/>
+        <p14:creationId xmlns:p14="http://schemas.microsoft.com/office/powerpoint/2010/main" val="522148683"/>
       </p:ext>
     </p:extLst>
   </p:cSld>
@@ -4081,7 +4315,7 @@
           <p:cNvPr id="2" name="제목 1">
             <a:extLst>
               <a:ext uri="{FF2B5EF4-FFF2-40B4-BE49-F238E27FC236}">
-                <a16:creationId xmlns:a16="http://schemas.microsoft.com/office/drawing/2014/main" id="{B2EEC095-E789-F5F0-E829-B90D9A74A8DE}"/>
+                <a16:creationId xmlns:a16="http://schemas.microsoft.com/office/drawing/2014/main" id="{014A300F-C093-E30C-1276-52287B031619}"/>
               </a:ext>
             </a:extLst>
           </p:cNvPr>
@@ -4099,7 +4333,7 @@
           <a:p>
             <a:r>
               <a:rPr lang="en-US" altLang="ko-KR" dirty="0"/>
-              <a:t>ORGANIZATION_BLOCK</a:t>
+              <a:t>*.AWL</a:t>
             </a:r>
             <a:endParaRPr lang="ko-KR" altLang="en-US" dirty="0"/>
           </a:p>
@@ -4110,7 +4344,7 @@
           <p:cNvPr id="3" name="내용 개체 틀 2">
             <a:extLst>
               <a:ext uri="{FF2B5EF4-FFF2-40B4-BE49-F238E27FC236}">
-                <a16:creationId xmlns:a16="http://schemas.microsoft.com/office/drawing/2014/main" id="{0A3D9FB2-1D4E-91B2-FF5E-16A99DB446AC}"/>
+                <a16:creationId xmlns:a16="http://schemas.microsoft.com/office/drawing/2014/main" id="{64286BFC-0D62-8DFD-E7AC-2578B7EE3238}"/>
               </a:ext>
             </a:extLst>
           </p:cNvPr>
@@ -4121,499 +4355,79 @@
             <p:ph idx="1"/>
           </p:nvPr>
         </p:nvSpPr>
-        <p:spPr>
-          <a:xfrm>
-            <a:off x="8384796" y="1825625"/>
-            <a:ext cx="2969004" cy="4351338"/>
-          </a:xfrm>
-        </p:spPr>
+        <p:spPr/>
         <p:txBody>
           <a:bodyPr/>
           <a:lstStyle/>
           <a:p>
-            <a:endParaRPr lang="ko-KR" altLang="en-US"/>
-          </a:p>
-        </p:txBody>
-      </p:sp>
-      <p:sp>
-        <p:nvSpPr>
-          <p:cNvPr id="5" name="TextBox 4">
-            <a:extLst>
-              <a:ext uri="{FF2B5EF4-FFF2-40B4-BE49-F238E27FC236}">
-                <a16:creationId xmlns:a16="http://schemas.microsoft.com/office/drawing/2014/main" id="{5916D703-327F-C43D-911E-740C1FBB07EF}"/>
-              </a:ext>
-            </a:extLst>
-          </p:cNvPr>
-          <p:cNvSpPr txBox="1"/>
-          <p:nvPr/>
-        </p:nvSpPr>
-        <p:spPr>
-          <a:xfrm>
-            <a:off x="888534" y="2360814"/>
-            <a:ext cx="6096698" cy="3631763"/>
-          </a:xfrm>
-          <a:prstGeom prst="rect">
-            <a:avLst/>
-          </a:prstGeom>
-          <a:noFill/>
-        </p:spPr>
-        <p:txBody>
-          <a:bodyPr wrap="square">
-            <a:spAutoFit/>
-          </a:bodyPr>
-          <a:lstStyle/>
-          <a:p>
-            <a:r>
-              <a:rPr lang="ko-KR" altLang="en-US" sz="1000" dirty="0"/>
-              <a:t>ORGANIZATION_BLOCK OB 80</a:t>
-            </a:r>
-          </a:p>
-          <a:p>
-            <a:r>
-              <a:rPr lang="ko-KR" altLang="en-US" sz="1000" dirty="0"/>
-              <a:t>TITLE = "</a:t>
-            </a:r>
-            <a:r>
-              <a:rPr lang="ko-KR" altLang="en-US" sz="1000" dirty="0" err="1"/>
-              <a:t>Cycle</a:t>
-            </a:r>
-            <a:r>
-              <a:rPr lang="ko-KR" altLang="en-US" sz="1000" dirty="0"/>
-              <a:t> Time </a:t>
-            </a:r>
-            <a:r>
-              <a:rPr lang="ko-KR" altLang="en-US" sz="1000" dirty="0" err="1"/>
-              <a:t>Fault</a:t>
-            </a:r>
-            <a:r>
-              <a:rPr lang="ko-KR" altLang="en-US" sz="1000" dirty="0"/>
-              <a:t>"</a:t>
-            </a:r>
-          </a:p>
-          <a:p>
-            <a:r>
-              <a:rPr lang="ko-KR" altLang="en-US" sz="1000" dirty="0"/>
-              <a:t>VERSION : 0.1</a:t>
-            </a:r>
-          </a:p>
-          <a:p>
-            <a:endParaRPr lang="ko-KR" altLang="en-US" sz="1000" dirty="0"/>
-          </a:p>
-          <a:p>
-            <a:r>
-              <a:rPr lang="ko-KR" altLang="en-US" sz="1000" dirty="0"/>
-              <a:t>VAR_TEMP</a:t>
-            </a:r>
-          </a:p>
-          <a:p>
-            <a:r>
-              <a:rPr lang="ko-KR" altLang="en-US" sz="1000" dirty="0"/>
-              <a:t>  OB80_EV_CLASS : BYTE ;	//16#35, </a:t>
-            </a:r>
-            <a:r>
-              <a:rPr lang="ko-KR" altLang="en-US" sz="1000" dirty="0" err="1"/>
-              <a:t>Event</a:t>
-            </a:r>
-            <a:r>
-              <a:rPr lang="ko-KR" altLang="en-US" sz="1000" dirty="0"/>
-              <a:t> </a:t>
-            </a:r>
-            <a:r>
-              <a:rPr lang="ko-KR" altLang="en-US" sz="1000" dirty="0" err="1"/>
-              <a:t>class</a:t>
-            </a:r>
-            <a:r>
-              <a:rPr lang="ko-KR" altLang="en-US" sz="1000" dirty="0"/>
-              <a:t> 3, </a:t>
-            </a:r>
-            <a:r>
-              <a:rPr lang="ko-KR" altLang="en-US" sz="1000" dirty="0" err="1"/>
-              <a:t>Entering</a:t>
-            </a:r>
-            <a:r>
-              <a:rPr lang="ko-KR" altLang="en-US" sz="1000" dirty="0"/>
-              <a:t> </a:t>
-            </a:r>
-            <a:r>
-              <a:rPr lang="ko-KR" altLang="en-US" sz="1000" dirty="0" err="1"/>
-              <a:t>event</a:t>
-            </a:r>
-            <a:r>
-              <a:rPr lang="ko-KR" altLang="en-US" sz="1000" dirty="0"/>
-              <a:t> </a:t>
-            </a:r>
-            <a:r>
-              <a:rPr lang="ko-KR" altLang="en-US" sz="1000" dirty="0" err="1"/>
-              <a:t>state</a:t>
-            </a:r>
-            <a:r>
-              <a:rPr lang="ko-KR" altLang="en-US" sz="1000" dirty="0"/>
-              <a:t>, </a:t>
-            </a:r>
-            <a:r>
-              <a:rPr lang="ko-KR" altLang="en-US" sz="1000" dirty="0" err="1"/>
-              <a:t>Internal</a:t>
-            </a:r>
-            <a:r>
-              <a:rPr lang="ko-KR" altLang="en-US" sz="1000" dirty="0"/>
-              <a:t> </a:t>
-            </a:r>
-            <a:r>
-              <a:rPr lang="ko-KR" altLang="en-US" sz="1000" dirty="0" err="1"/>
-              <a:t>fault</a:t>
-            </a:r>
-            <a:r>
-              <a:rPr lang="ko-KR" altLang="en-US" sz="1000" dirty="0"/>
-              <a:t> </a:t>
-            </a:r>
-            <a:r>
-              <a:rPr lang="ko-KR" altLang="en-US" sz="1000" dirty="0" err="1"/>
-              <a:t>event</a:t>
-            </a:r>
-            <a:endParaRPr lang="ko-KR" altLang="en-US" sz="1000" dirty="0"/>
-          </a:p>
-          <a:p>
-            <a:r>
-              <a:rPr lang="ko-KR" altLang="en-US" sz="1000" dirty="0"/>
-              <a:t>  OB80_FLT_ID : BYTE ;	//16#XX, </a:t>
-            </a:r>
-            <a:r>
-              <a:rPr lang="ko-KR" altLang="en-US" sz="1000" dirty="0" err="1"/>
-              <a:t>Fault</a:t>
-            </a:r>
-            <a:r>
-              <a:rPr lang="ko-KR" altLang="en-US" sz="1000" dirty="0"/>
-              <a:t> </a:t>
-            </a:r>
-            <a:r>
-              <a:rPr lang="ko-KR" altLang="en-US" sz="1000" dirty="0" err="1"/>
-              <a:t>identifcation</a:t>
-            </a:r>
-            <a:r>
-              <a:rPr lang="ko-KR" altLang="en-US" sz="1000" dirty="0"/>
-              <a:t> </a:t>
-            </a:r>
-            <a:r>
-              <a:rPr lang="ko-KR" altLang="en-US" sz="1000" dirty="0" err="1"/>
-              <a:t>code</a:t>
-            </a:r>
-            <a:endParaRPr lang="ko-KR" altLang="en-US" sz="1000" dirty="0"/>
-          </a:p>
-          <a:p>
-            <a:r>
-              <a:rPr lang="ko-KR" altLang="en-US" sz="1000" dirty="0"/>
-              <a:t>  OB80_PRIORITY : BYTE ;	//</a:t>
-            </a:r>
-            <a:r>
-              <a:rPr lang="ko-KR" altLang="en-US" sz="1000" dirty="0" err="1"/>
-              <a:t>Priority</a:t>
-            </a:r>
-            <a:r>
-              <a:rPr lang="ko-KR" altLang="en-US" sz="1000" dirty="0"/>
-              <a:t> of OB </a:t>
-            </a:r>
-            <a:r>
-              <a:rPr lang="ko-KR" altLang="en-US" sz="1000" dirty="0" err="1"/>
-              <a:t>Execution</a:t>
-            </a:r>
-            <a:endParaRPr lang="ko-KR" altLang="en-US" sz="1000" dirty="0"/>
-          </a:p>
-          <a:p>
-            <a:r>
-              <a:rPr lang="ko-KR" altLang="en-US" sz="1000" dirty="0"/>
-              <a:t>  OB80_OB_NUMBR : BYTE ;	//80 (</a:t>
-            </a:r>
-            <a:r>
-              <a:rPr lang="ko-KR" altLang="en-US" sz="1000" dirty="0" err="1"/>
-              <a:t>Organization</a:t>
-            </a:r>
-            <a:r>
-              <a:rPr lang="ko-KR" altLang="en-US" sz="1000" dirty="0"/>
-              <a:t> </a:t>
-            </a:r>
-            <a:r>
-              <a:rPr lang="ko-KR" altLang="en-US" sz="1000" dirty="0" err="1"/>
-              <a:t>block</a:t>
-            </a:r>
-            <a:r>
-              <a:rPr lang="ko-KR" altLang="en-US" sz="1000" dirty="0"/>
-              <a:t> 80, OB80)</a:t>
-            </a:r>
-          </a:p>
-          <a:p>
-            <a:r>
-              <a:rPr lang="ko-KR" altLang="en-US" sz="1000" dirty="0"/>
-              <a:t>  OB80_RESERVED_1 : BYTE ;	//</a:t>
-            </a:r>
-            <a:r>
-              <a:rPr lang="ko-KR" altLang="en-US" sz="1000" dirty="0" err="1"/>
-              <a:t>Reserved</a:t>
-            </a:r>
-            <a:r>
-              <a:rPr lang="ko-KR" altLang="en-US" sz="1000" dirty="0"/>
-              <a:t> </a:t>
-            </a:r>
-            <a:r>
-              <a:rPr lang="ko-KR" altLang="en-US" sz="1000" dirty="0" err="1"/>
-              <a:t>for</a:t>
-            </a:r>
-            <a:r>
-              <a:rPr lang="ko-KR" altLang="en-US" sz="1000" dirty="0"/>
-              <a:t> </a:t>
-            </a:r>
-            <a:r>
-              <a:rPr lang="ko-KR" altLang="en-US" sz="1000" dirty="0" err="1"/>
-              <a:t>system</a:t>
-            </a:r>
-            <a:endParaRPr lang="ko-KR" altLang="en-US" sz="1000" dirty="0"/>
-          </a:p>
-          <a:p>
-            <a:r>
-              <a:rPr lang="ko-KR" altLang="en-US" sz="1000" dirty="0"/>
-              <a:t>  OB80_RESERVED_2 : BYTE ;	//</a:t>
-            </a:r>
-            <a:r>
-              <a:rPr lang="ko-KR" altLang="en-US" sz="1000" dirty="0" err="1"/>
-              <a:t>Reserved</a:t>
-            </a:r>
-            <a:r>
-              <a:rPr lang="ko-KR" altLang="en-US" sz="1000" dirty="0"/>
-              <a:t> </a:t>
-            </a:r>
-            <a:r>
-              <a:rPr lang="ko-KR" altLang="en-US" sz="1000" dirty="0" err="1"/>
-              <a:t>for</a:t>
-            </a:r>
-            <a:r>
-              <a:rPr lang="ko-KR" altLang="en-US" sz="1000" dirty="0"/>
-              <a:t> </a:t>
-            </a:r>
-            <a:r>
-              <a:rPr lang="ko-KR" altLang="en-US" sz="1000" dirty="0" err="1"/>
-              <a:t>system</a:t>
-            </a:r>
-            <a:endParaRPr lang="ko-KR" altLang="en-US" sz="1000" dirty="0"/>
-          </a:p>
-          <a:p>
-            <a:r>
-              <a:rPr lang="ko-KR" altLang="en-US" sz="1000" dirty="0"/>
-              <a:t>  OB80_ERROR_INFO : WORD ;	//</a:t>
-            </a:r>
-            <a:r>
-              <a:rPr lang="ko-KR" altLang="en-US" sz="1000" dirty="0" err="1"/>
-              <a:t>Error</a:t>
-            </a:r>
-            <a:r>
-              <a:rPr lang="ko-KR" altLang="en-US" sz="1000" dirty="0"/>
-              <a:t> </a:t>
-            </a:r>
-            <a:r>
-              <a:rPr lang="ko-KR" altLang="en-US" sz="1000" dirty="0" err="1"/>
-              <a:t>information</a:t>
-            </a:r>
-            <a:r>
-              <a:rPr lang="ko-KR" altLang="en-US" sz="1000" dirty="0"/>
-              <a:t> </a:t>
-            </a:r>
-            <a:r>
-              <a:rPr lang="ko-KR" altLang="en-US" sz="1000" dirty="0" err="1"/>
-              <a:t>on</a:t>
-            </a:r>
-            <a:r>
-              <a:rPr lang="ko-KR" altLang="en-US" sz="1000" dirty="0"/>
-              <a:t> </a:t>
-            </a:r>
-            <a:r>
-              <a:rPr lang="ko-KR" altLang="en-US" sz="1000" dirty="0" err="1"/>
-              <a:t>event</a:t>
-            </a:r>
-            <a:endParaRPr lang="ko-KR" altLang="en-US" sz="1000" dirty="0"/>
-          </a:p>
-          <a:p>
-            <a:r>
-              <a:rPr lang="ko-KR" altLang="en-US" sz="1000" dirty="0"/>
-              <a:t>  OB80_ERR_EV_CLASS : BYTE ;	//</a:t>
-            </a:r>
-            <a:r>
-              <a:rPr lang="ko-KR" altLang="en-US" sz="1000" dirty="0" err="1"/>
-              <a:t>Class</a:t>
-            </a:r>
-            <a:r>
-              <a:rPr lang="ko-KR" altLang="en-US" sz="1000" dirty="0"/>
-              <a:t> of </a:t>
-            </a:r>
-            <a:r>
-              <a:rPr lang="ko-KR" altLang="en-US" sz="1000" dirty="0" err="1"/>
-              <a:t>event</a:t>
-            </a:r>
-            <a:r>
-              <a:rPr lang="ko-KR" altLang="en-US" sz="1000" dirty="0"/>
-              <a:t> </a:t>
-            </a:r>
-            <a:r>
-              <a:rPr lang="ko-KR" altLang="en-US" sz="1000" dirty="0" err="1"/>
-              <a:t>causing</a:t>
-            </a:r>
-            <a:r>
-              <a:rPr lang="ko-KR" altLang="en-US" sz="1000" dirty="0"/>
-              <a:t> </a:t>
-            </a:r>
-            <a:r>
-              <a:rPr lang="ko-KR" altLang="en-US" sz="1000" dirty="0" err="1"/>
-              <a:t>error</a:t>
-            </a:r>
-            <a:endParaRPr lang="ko-KR" altLang="en-US" sz="1000" dirty="0"/>
-          </a:p>
-          <a:p>
-            <a:r>
-              <a:rPr lang="ko-KR" altLang="en-US" sz="1000" dirty="0"/>
-              <a:t>  OB80_ERR_EV_NUM : BYTE ;	//</a:t>
-            </a:r>
-            <a:r>
-              <a:rPr lang="ko-KR" altLang="en-US" sz="1000" dirty="0" err="1"/>
-              <a:t>Number</a:t>
-            </a:r>
-            <a:r>
-              <a:rPr lang="ko-KR" altLang="en-US" sz="1000" dirty="0"/>
-              <a:t> of </a:t>
-            </a:r>
-            <a:r>
-              <a:rPr lang="ko-KR" altLang="en-US" sz="1000" dirty="0" err="1"/>
-              <a:t>event</a:t>
-            </a:r>
-            <a:r>
-              <a:rPr lang="ko-KR" altLang="en-US" sz="1000" dirty="0"/>
-              <a:t> </a:t>
-            </a:r>
-            <a:r>
-              <a:rPr lang="ko-KR" altLang="en-US" sz="1000" dirty="0" err="1"/>
-              <a:t>causing</a:t>
-            </a:r>
-            <a:r>
-              <a:rPr lang="ko-KR" altLang="en-US" sz="1000" dirty="0"/>
-              <a:t> </a:t>
-            </a:r>
-            <a:r>
-              <a:rPr lang="ko-KR" altLang="en-US" sz="1000" dirty="0" err="1"/>
-              <a:t>error</a:t>
-            </a:r>
-            <a:endParaRPr lang="ko-KR" altLang="en-US" sz="1000" dirty="0"/>
-          </a:p>
-          <a:p>
-            <a:r>
-              <a:rPr lang="ko-KR" altLang="en-US" sz="1000" dirty="0"/>
-              <a:t>  OB80_OB_PRIORITY : BYTE ;	//</a:t>
-            </a:r>
-            <a:r>
-              <a:rPr lang="ko-KR" altLang="en-US" sz="1000" dirty="0" err="1"/>
-              <a:t>Priority</a:t>
-            </a:r>
-            <a:r>
-              <a:rPr lang="ko-KR" altLang="en-US" sz="1000" dirty="0"/>
-              <a:t> of OB </a:t>
-            </a:r>
-            <a:r>
-              <a:rPr lang="ko-KR" altLang="en-US" sz="1000" dirty="0" err="1"/>
-              <a:t>causing</a:t>
-            </a:r>
-            <a:r>
-              <a:rPr lang="ko-KR" altLang="en-US" sz="1000" dirty="0"/>
-              <a:t> </a:t>
-            </a:r>
-            <a:r>
-              <a:rPr lang="ko-KR" altLang="en-US" sz="1000" dirty="0" err="1"/>
-              <a:t>error</a:t>
-            </a:r>
-            <a:endParaRPr lang="ko-KR" altLang="en-US" sz="1000" dirty="0"/>
-          </a:p>
-          <a:p>
-            <a:r>
-              <a:rPr lang="ko-KR" altLang="en-US" sz="1000" dirty="0"/>
-              <a:t>  OB80_OB_NUM : BYTE ;	//</a:t>
-            </a:r>
-            <a:r>
-              <a:rPr lang="ko-KR" altLang="en-US" sz="1000" dirty="0" err="1"/>
-              <a:t>Number</a:t>
-            </a:r>
-            <a:r>
-              <a:rPr lang="ko-KR" altLang="en-US" sz="1000" dirty="0"/>
-              <a:t> of OB </a:t>
-            </a:r>
-            <a:r>
-              <a:rPr lang="ko-KR" altLang="en-US" sz="1000" dirty="0" err="1"/>
-              <a:t>causing</a:t>
-            </a:r>
-            <a:r>
-              <a:rPr lang="ko-KR" altLang="en-US" sz="1000" dirty="0"/>
-              <a:t> </a:t>
-            </a:r>
-            <a:r>
-              <a:rPr lang="ko-KR" altLang="en-US" sz="1000" dirty="0" err="1"/>
-              <a:t>error</a:t>
-            </a:r>
-            <a:endParaRPr lang="ko-KR" altLang="en-US" sz="1000" dirty="0"/>
-          </a:p>
-          <a:p>
-            <a:r>
-              <a:rPr lang="ko-KR" altLang="en-US" sz="1000" dirty="0"/>
-              <a:t>  OB80_DATE_TIME : DATE_AND_TIME ;	//</a:t>
-            </a:r>
-            <a:r>
-              <a:rPr lang="ko-KR" altLang="en-US" sz="1000" dirty="0" err="1"/>
-              <a:t>Date</a:t>
-            </a:r>
-            <a:r>
-              <a:rPr lang="ko-KR" altLang="en-US" sz="1000" dirty="0"/>
-              <a:t> and </a:t>
-            </a:r>
-            <a:r>
-              <a:rPr lang="ko-KR" altLang="en-US" sz="1000" dirty="0" err="1"/>
-              <a:t>time</a:t>
-            </a:r>
-            <a:r>
-              <a:rPr lang="ko-KR" altLang="en-US" sz="1000" dirty="0"/>
-              <a:t> OB80 </a:t>
-            </a:r>
-            <a:r>
-              <a:rPr lang="ko-KR" altLang="en-US" sz="1000" dirty="0" err="1"/>
-              <a:t>started</a:t>
-            </a:r>
-            <a:r>
-              <a:rPr lang="ko-KR" altLang="en-US" sz="1000" dirty="0"/>
-              <a:t>   </a:t>
-            </a:r>
-          </a:p>
-          <a:p>
-            <a:r>
-              <a:rPr lang="ko-KR" altLang="en-US" sz="1000" dirty="0"/>
-              <a:t>END_VAR</a:t>
-            </a:r>
-          </a:p>
-          <a:p>
-            <a:r>
-              <a:rPr lang="ko-KR" altLang="en-US" sz="1000" dirty="0"/>
-              <a:t>BEGIN</a:t>
-            </a:r>
-          </a:p>
-          <a:p>
-            <a:r>
-              <a:rPr lang="ko-KR" altLang="en-US" sz="1000" dirty="0"/>
-              <a:t>NETWORK</a:t>
-            </a:r>
-          </a:p>
-          <a:p>
-            <a:r>
-              <a:rPr lang="ko-KR" altLang="en-US" sz="1000" dirty="0"/>
-              <a:t>TITLE =</a:t>
-            </a:r>
-          </a:p>
-          <a:p>
-            <a:endParaRPr lang="ko-KR" altLang="en-US" sz="1000" dirty="0"/>
-          </a:p>
-          <a:p>
-            <a:r>
-              <a:rPr lang="ko-KR" altLang="en-US" sz="1000" dirty="0"/>
-              <a:t>END_ORGANIZATION_BLOCK</a:t>
+            <a:r>
+              <a:rPr lang="en-US" altLang="ko-KR" dirty="0" err="1"/>
+              <a:t>EucKR</a:t>
+            </a:r>
+            <a:endParaRPr lang="en-US" altLang="ko-KR" dirty="0"/>
+          </a:p>
+          <a:p>
+            <a:r>
+              <a:rPr lang="en-US" altLang="ko-KR" dirty="0"/>
+              <a:t>Parser </a:t>
+            </a:r>
+            <a:r>
+              <a:rPr lang="ko-KR" altLang="en-US" dirty="0"/>
+              <a:t>부적합</a:t>
+            </a:r>
+            <a:r>
+              <a:rPr lang="en-US" altLang="ko-KR" dirty="0"/>
+              <a:t>.  </a:t>
+            </a:r>
+          </a:p>
+          <a:p>
+            <a:pPr lvl="1"/>
+            <a:r>
+              <a:rPr lang="en-US" altLang="ko-KR" dirty="0"/>
+              <a:t>Raw text read &amp; parse</a:t>
+            </a:r>
+          </a:p>
+          <a:p>
+            <a:pPr lvl="1"/>
+            <a:r>
+              <a:rPr lang="ko-KR" altLang="en-US" dirty="0"/>
+              <a:t>시작 </a:t>
+            </a:r>
+            <a:r>
+              <a:rPr lang="en-US" altLang="ko-KR" dirty="0"/>
+              <a:t>Indent, </a:t>
+            </a:r>
+            <a:r>
+              <a:rPr lang="ko-KR" altLang="en-US" dirty="0"/>
+              <a:t>종료 </a:t>
+            </a:r>
+            <a:r>
+              <a:rPr lang="en-US" altLang="ko-KR" dirty="0"/>
+              <a:t>‘;’ </a:t>
+            </a:r>
+            <a:r>
+              <a:rPr lang="ko-KR" altLang="en-US" dirty="0"/>
+              <a:t>중요</a:t>
+            </a:r>
+            <a:endParaRPr lang="en-US" altLang="ko-KR" dirty="0"/>
+          </a:p>
+          <a:p>
+            <a:pPr lvl="1"/>
+            <a:r>
+              <a:rPr lang="en-US" altLang="ko-KR" dirty="0"/>
+              <a:t>// </a:t>
+            </a:r>
+            <a:r>
+              <a:rPr lang="ko-KR" altLang="en-US" dirty="0"/>
+              <a:t>부터 라인 끝까지는 사용자 </a:t>
+            </a:r>
+            <a:r>
+              <a:rPr lang="en-US" altLang="ko-KR" dirty="0"/>
+              <a:t>comment </a:t>
+            </a:r>
+            <a:r>
+              <a:rPr lang="ko-KR" altLang="en-US" dirty="0"/>
+              <a:t>로 해석</a:t>
             </a:r>
           </a:p>
         </p:txBody>
@@ -4624,7 +4438,7 @@
     </p:custDataLst>
     <p:extLst>
       <p:ext uri="{BB962C8B-B14F-4D97-AF65-F5344CB8AC3E}">
-        <p14:creationId xmlns:p14="http://schemas.microsoft.com/office/powerpoint/2010/main" val="690715674"/>
+        <p14:creationId xmlns:p14="http://schemas.microsoft.com/office/powerpoint/2010/main" val="1420040040"/>
       </p:ext>
     </p:extLst>
   </p:cSld>
@@ -4656,7 +4470,7 @@
           <p:cNvPr id="2" name="제목 1">
             <a:extLst>
               <a:ext uri="{FF2B5EF4-FFF2-40B4-BE49-F238E27FC236}">
-                <a16:creationId xmlns:a16="http://schemas.microsoft.com/office/drawing/2014/main" id="{875077B2-B955-EF16-1EB5-C5DCCE550135}"/>
+                <a16:creationId xmlns:a16="http://schemas.microsoft.com/office/drawing/2014/main" id="{B2EEC095-E789-F5F0-E829-B90D9A74A8DE}"/>
               </a:ext>
             </a:extLst>
           </p:cNvPr>
@@ -4674,7 +4488,7 @@
           <a:p>
             <a:r>
               <a:rPr lang="en-US" altLang="ko-KR" dirty="0"/>
-              <a:t>*.SDF</a:t>
+              <a:t>ORGANIZATION_BLOCK</a:t>
             </a:r>
             <a:endParaRPr lang="ko-KR" altLang="en-US" dirty="0"/>
           </a:p>
@@ -4685,7 +4499,7 @@
           <p:cNvPr id="3" name="내용 개체 틀 2">
             <a:extLst>
               <a:ext uri="{FF2B5EF4-FFF2-40B4-BE49-F238E27FC236}">
-                <a16:creationId xmlns:a16="http://schemas.microsoft.com/office/drawing/2014/main" id="{75DC9B40-D6A9-EAB5-F30E-7D78FC6BC3C9}"/>
+                <a16:creationId xmlns:a16="http://schemas.microsoft.com/office/drawing/2014/main" id="{0A3D9FB2-1D4E-91B2-FF5E-16A99DB446AC}"/>
               </a:ext>
             </a:extLst>
           </p:cNvPr>
@@ -4698,57 +4512,15 @@
         </p:nvSpPr>
         <p:spPr>
           <a:xfrm>
-            <a:off x="5654180" y="1825625"/>
-            <a:ext cx="5699620" cy="4351338"/>
+            <a:off x="8384796" y="1825625"/>
+            <a:ext cx="2969004" cy="4351338"/>
           </a:xfrm>
         </p:spPr>
         <p:txBody>
           <a:bodyPr/>
           <a:lstStyle/>
           <a:p>
-            <a:r>
-              <a:rPr lang="en-US" altLang="ko-KR" dirty="0"/>
-              <a:t>“Field1”, “Filed2”, … </a:t>
-            </a:r>
-            <a:r>
-              <a:rPr lang="ko-KR" altLang="en-US" dirty="0"/>
-              <a:t>형태</a:t>
-            </a:r>
-          </a:p>
-          <a:p>
-            <a:r>
-              <a:rPr lang="en-US" altLang="ko-KR" dirty="0"/>
-              <a:t>‘,’ </a:t>
-            </a:r>
-            <a:r>
-              <a:rPr lang="ko-KR" altLang="en-US" dirty="0"/>
-              <a:t>구분자로 </a:t>
-            </a:r>
-            <a:r>
-              <a:rPr lang="en-US" altLang="ko-KR" dirty="0"/>
-              <a:t>text parsing </a:t>
-            </a:r>
-            <a:r>
-              <a:rPr lang="ko-KR" altLang="en-US" dirty="0"/>
-              <a:t>해도 될 듯</a:t>
-            </a:r>
-            <a:r>
-              <a:rPr lang="en-US" altLang="ko-KR" dirty="0"/>
-              <a:t>.   Column </a:t>
-            </a:r>
-            <a:r>
-              <a:rPr lang="ko-KR" altLang="en-US" dirty="0"/>
-              <a:t>에 </a:t>
-            </a:r>
-            <a:r>
-              <a:rPr lang="en-US" altLang="ko-KR" dirty="0"/>
-              <a:t>‘,’ </a:t>
-            </a:r>
-            <a:r>
-              <a:rPr lang="ko-KR" altLang="en-US" dirty="0"/>
-              <a:t>포함하는 경우의 형태 파악 필요</a:t>
-            </a:r>
-            <a:endParaRPr lang="en-US" altLang="ko-KR" dirty="0"/>
+            <a:endParaRPr lang="ko-KR" altLang="en-US"/>
           </a:p>
         </p:txBody>
       </p:sp>
@@ -4757,7 +4529,7 @@
           <p:cNvPr id="5" name="TextBox 4">
             <a:extLst>
               <a:ext uri="{FF2B5EF4-FFF2-40B4-BE49-F238E27FC236}">
-                <a16:creationId xmlns:a16="http://schemas.microsoft.com/office/drawing/2014/main" id="{6A16D061-9980-ECA9-8FFE-A3EDCDCC4525}"/>
+                <a16:creationId xmlns:a16="http://schemas.microsoft.com/office/drawing/2014/main" id="{5916D703-327F-C43D-911E-740C1FBB07EF}"/>
               </a:ext>
             </a:extLst>
           </p:cNvPr>
@@ -4766,8 +4538,8 @@
         </p:nvSpPr>
         <p:spPr>
           <a:xfrm>
-            <a:off x="656128" y="2123349"/>
-            <a:ext cx="4175932" cy="2092881"/>
+            <a:off x="888534" y="2360814"/>
+            <a:ext cx="6096698" cy="3631763"/>
           </a:xfrm>
           <a:prstGeom prst="rect">
             <a:avLst/>
@@ -4781,236 +4553,456 @@
           <a:lstStyle/>
           <a:p>
             <a:r>
-              <a:rPr lang="en-US" altLang="ko-KR" sz="1000" dirty="0"/>
-              <a:t>"#13 T </a:t>
-            </a:r>
-            <a:r>
-              <a:rPr lang="ko-KR" altLang="en-US" sz="1000" dirty="0" err="1"/>
-              <a:t>부저정지지연</a:t>
-            </a:r>
-            <a:r>
-              <a:rPr lang="ko-KR" altLang="en-US" sz="1000" dirty="0"/>
-              <a:t>      </a:t>
-            </a:r>
-            <a:r>
-              <a:rPr lang="en-US" altLang="ko-KR" sz="1000" dirty="0"/>
-              <a:t>",  "T      99   ",  "TIMER     ",    "        "</a:t>
-            </a:r>
-          </a:p>
-          <a:p>
-            <a:r>
-              <a:rPr lang="en-US" altLang="ko-KR" sz="1000" dirty="0"/>
-              <a:t>"#708-1 DP1 10</a:t>
-            </a:r>
-            <a:r>
-              <a:rPr lang="ko-KR" altLang="en-US" sz="1000" dirty="0" err="1"/>
-              <a:t>국이상</a:t>
-            </a:r>
-            <a:r>
-              <a:rPr lang="ko-KR" altLang="en-US" sz="1000" dirty="0"/>
-              <a:t>     </a:t>
-            </a:r>
-            <a:r>
-              <a:rPr lang="en-US" altLang="ko-KR" sz="1000" dirty="0"/>
-              <a:t>","M     981.1 ","BOOL      ","        "</a:t>
-            </a:r>
-          </a:p>
-          <a:p>
-            <a:r>
-              <a:rPr lang="en-US" altLang="ko-KR" sz="1000" dirty="0"/>
-              <a:t>"#708-1 DP1 11</a:t>
-            </a:r>
-            <a:r>
-              <a:rPr lang="ko-KR" altLang="en-US" sz="1000" dirty="0" err="1"/>
-              <a:t>국이상</a:t>
-            </a:r>
-            <a:r>
-              <a:rPr lang="ko-KR" altLang="en-US" sz="1000" dirty="0"/>
-              <a:t>     </a:t>
-            </a:r>
-            <a:r>
-              <a:rPr lang="en-US" altLang="ko-KR" sz="1000" dirty="0"/>
-              <a:t>","M     981.2 ","BOOL      ","        "</a:t>
-            </a:r>
-          </a:p>
-          <a:p>
-            <a:r>
-              <a:rPr lang="en-US" altLang="ko-KR" sz="1000" dirty="0"/>
-              <a:t>"#708-1 DP1 12</a:t>
-            </a:r>
-            <a:r>
-              <a:rPr lang="ko-KR" altLang="en-US" sz="1000" dirty="0" err="1"/>
-              <a:t>국이상</a:t>
-            </a:r>
-            <a:r>
-              <a:rPr lang="ko-KR" altLang="en-US" sz="1000" dirty="0"/>
-              <a:t>     </a:t>
-            </a:r>
-            <a:r>
-              <a:rPr lang="en-US" altLang="ko-KR" sz="1000" dirty="0"/>
-              <a:t>","M     981.3 ","BOOL      ","        "</a:t>
-            </a:r>
-          </a:p>
-          <a:p>
-            <a:r>
-              <a:rPr lang="en-US" altLang="ko-KR" sz="1000" dirty="0"/>
-              <a:t>"#708-1 DP1 13</a:t>
-            </a:r>
-            <a:r>
-              <a:rPr lang="ko-KR" altLang="en-US" sz="1000" dirty="0" err="1"/>
-              <a:t>국이상</a:t>
-            </a:r>
-            <a:r>
-              <a:rPr lang="ko-KR" altLang="en-US" sz="1000" dirty="0"/>
-              <a:t>     </a:t>
-            </a:r>
-            <a:r>
-              <a:rPr lang="en-US" altLang="ko-KR" sz="1000" dirty="0"/>
-              <a:t>","M     981.4 ","BOOL      ","        "</a:t>
-            </a:r>
-          </a:p>
-          <a:p>
-            <a:r>
-              <a:rPr lang="en-US" altLang="ko-KR" sz="1000" dirty="0"/>
-              <a:t>"#708-1 DP1 14</a:t>
-            </a:r>
-            <a:r>
-              <a:rPr lang="ko-KR" altLang="en-US" sz="1000" dirty="0" err="1"/>
-              <a:t>국이상</a:t>
-            </a:r>
-            <a:r>
-              <a:rPr lang="ko-KR" altLang="en-US" sz="1000" dirty="0"/>
-              <a:t>     </a:t>
-            </a:r>
-            <a:r>
-              <a:rPr lang="en-US" altLang="ko-KR" sz="1000" dirty="0"/>
-              <a:t>","M     981.5 ","BOOL      ","        "</a:t>
-            </a:r>
-          </a:p>
-          <a:p>
-            <a:r>
-              <a:rPr lang="en-US" altLang="ko-KR" sz="1000" dirty="0"/>
-              <a:t>"#708-1 DP1 15</a:t>
-            </a:r>
-            <a:r>
-              <a:rPr lang="ko-KR" altLang="en-US" sz="1000" dirty="0" err="1"/>
-              <a:t>국이상</a:t>
-            </a:r>
-            <a:r>
-              <a:rPr lang="ko-KR" altLang="en-US" sz="1000" dirty="0"/>
-              <a:t>     </a:t>
-            </a:r>
-            <a:r>
-              <a:rPr lang="en-US" altLang="ko-KR" sz="1000" dirty="0"/>
-              <a:t>","M     981.6 ","BOOL      ","        "</a:t>
-            </a:r>
-          </a:p>
-          <a:p>
-            <a:r>
-              <a:rPr lang="en-US" altLang="ko-KR" sz="1000" dirty="0"/>
-              <a:t>"#708-1 DP1 16</a:t>
-            </a:r>
-            <a:r>
-              <a:rPr lang="ko-KR" altLang="en-US" sz="1000" dirty="0" err="1"/>
-              <a:t>국이상</a:t>
-            </a:r>
-            <a:r>
-              <a:rPr lang="ko-KR" altLang="en-US" sz="1000" dirty="0"/>
-              <a:t>     </a:t>
-            </a:r>
-            <a:r>
-              <a:rPr lang="en-US" altLang="ko-KR" sz="1000" dirty="0"/>
-              <a:t>","M     981.7 ","BOOL      ","        "</a:t>
-            </a:r>
-          </a:p>
-          <a:p>
-            <a:r>
-              <a:rPr lang="en-US" altLang="ko-KR" sz="1000" dirty="0"/>
-              <a:t>"#708-1 DP1 1</a:t>
-            </a:r>
-            <a:r>
-              <a:rPr lang="ko-KR" altLang="en-US" sz="1000" dirty="0" err="1"/>
-              <a:t>국이상</a:t>
-            </a:r>
-            <a:r>
-              <a:rPr lang="ko-KR" altLang="en-US" sz="1000" dirty="0"/>
-              <a:t>      </a:t>
-            </a:r>
-            <a:r>
-              <a:rPr lang="en-US" altLang="ko-KR" sz="1000" dirty="0"/>
-              <a:t>","M     980.0 ","BOOL      ","        "</a:t>
-            </a:r>
-          </a:p>
-          <a:p>
-            <a:r>
-              <a:rPr lang="en-US" altLang="ko-KR" sz="1000" dirty="0"/>
-              <a:t>"#708-1 DP1 2</a:t>
-            </a:r>
-            <a:r>
-              <a:rPr lang="ko-KR" altLang="en-US" sz="1000" dirty="0" err="1"/>
-              <a:t>국이상</a:t>
-            </a:r>
-            <a:r>
-              <a:rPr lang="ko-KR" altLang="en-US" sz="1000" dirty="0"/>
-              <a:t>      </a:t>
-            </a:r>
-            <a:r>
-              <a:rPr lang="en-US" altLang="ko-KR" sz="1000" dirty="0"/>
-              <a:t>","M     980.1 ","BOOL      ","        "</a:t>
-            </a:r>
-          </a:p>
-          <a:p>
-            <a:r>
-              <a:rPr lang="en-US" altLang="ko-KR" sz="1000" dirty="0"/>
-              <a:t>"#708-1 DP1 3</a:t>
-            </a:r>
-            <a:r>
-              <a:rPr lang="ko-KR" altLang="en-US" sz="1000" dirty="0" err="1"/>
-              <a:t>국이상</a:t>
-            </a:r>
-            <a:r>
-              <a:rPr lang="ko-KR" altLang="en-US" sz="1000" dirty="0"/>
-              <a:t>      </a:t>
-            </a:r>
-            <a:r>
-              <a:rPr lang="en-US" altLang="ko-KR" sz="1000" dirty="0"/>
-              <a:t>","M     980.2 ","BOOL      ","        "</a:t>
-            </a:r>
-          </a:p>
-          <a:p>
-            <a:r>
-              <a:rPr lang="en-US" altLang="ko-KR" sz="1000" dirty="0"/>
-              <a:t>"#708-1 DP1 4</a:t>
-            </a:r>
-            <a:r>
-              <a:rPr lang="ko-KR" altLang="en-US" sz="1000" dirty="0" err="1"/>
-              <a:t>국이상</a:t>
-            </a:r>
-            <a:r>
-              <a:rPr lang="ko-KR" altLang="en-US" sz="1000" dirty="0"/>
-              <a:t>      </a:t>
-            </a:r>
-            <a:r>
-              <a:rPr lang="en-US" altLang="ko-KR" sz="1000" dirty="0"/>
-              <a:t>","M     980.3 ","BOOL      ","        "</a:t>
-            </a:r>
-          </a:p>
-          <a:p>
-            <a:r>
-              <a:rPr lang="en-US" altLang="ko-KR" sz="1000" dirty="0"/>
-              <a:t>"#708-1 DP1 5</a:t>
-            </a:r>
-            <a:r>
-              <a:rPr lang="ko-KR" altLang="en-US" sz="1000" dirty="0" err="1"/>
-              <a:t>국이상</a:t>
-            </a:r>
-            <a:r>
-              <a:rPr lang="ko-KR" altLang="en-US" sz="1000" dirty="0"/>
-              <a:t>      </a:t>
-            </a:r>
-            <a:r>
-              <a:rPr lang="en-US" altLang="ko-KR" sz="1000" dirty="0"/>
-              <a:t>","M     980.4 ","BOOL      ","        "</a:t>
+              <a:rPr lang="ko-KR" altLang="en-US" sz="1000" dirty="0"/>
+              <a:t>ORGANIZATION_BLOCK OB 80</a:t>
+            </a:r>
+          </a:p>
+          <a:p>
+            <a:r>
+              <a:rPr lang="ko-KR" altLang="en-US" sz="1000" dirty="0"/>
+              <a:t>TITLE = "</a:t>
+            </a:r>
+            <a:r>
+              <a:rPr lang="ko-KR" altLang="en-US" sz="1000" dirty="0" err="1"/>
+              <a:t>Cycle</a:t>
+            </a:r>
+            <a:r>
+              <a:rPr lang="ko-KR" altLang="en-US" sz="1000" dirty="0"/>
+              <a:t> Time </a:t>
+            </a:r>
+            <a:r>
+              <a:rPr lang="ko-KR" altLang="en-US" sz="1000" dirty="0" err="1"/>
+              <a:t>Fault</a:t>
+            </a:r>
+            <a:r>
+              <a:rPr lang="ko-KR" altLang="en-US" sz="1000" dirty="0"/>
+              <a:t>"</a:t>
+            </a:r>
+          </a:p>
+          <a:p>
+            <a:r>
+              <a:rPr lang="ko-KR" altLang="en-US" sz="1000" dirty="0"/>
+              <a:t>VERSION : 0.1</a:t>
+            </a:r>
+          </a:p>
+          <a:p>
+            <a:endParaRPr lang="ko-KR" altLang="en-US" sz="1000" dirty="0"/>
+          </a:p>
+          <a:p>
+            <a:r>
+              <a:rPr lang="ko-KR" altLang="en-US" sz="1000" dirty="0"/>
+              <a:t>VAR_TEMP</a:t>
+            </a:r>
+          </a:p>
+          <a:p>
+            <a:r>
+              <a:rPr lang="ko-KR" altLang="en-US" sz="1000" dirty="0"/>
+              <a:t>  OB80_EV_CLASS : BYTE ;	//16#35, </a:t>
+            </a:r>
+            <a:r>
+              <a:rPr lang="ko-KR" altLang="en-US" sz="1000" dirty="0" err="1"/>
+              <a:t>Event</a:t>
+            </a:r>
+            <a:r>
+              <a:rPr lang="ko-KR" altLang="en-US" sz="1000" dirty="0"/>
+              <a:t> </a:t>
+            </a:r>
+            <a:r>
+              <a:rPr lang="ko-KR" altLang="en-US" sz="1000" dirty="0" err="1"/>
+              <a:t>class</a:t>
+            </a:r>
+            <a:r>
+              <a:rPr lang="ko-KR" altLang="en-US" sz="1000" dirty="0"/>
+              <a:t> 3, </a:t>
+            </a:r>
+            <a:r>
+              <a:rPr lang="ko-KR" altLang="en-US" sz="1000" dirty="0" err="1"/>
+              <a:t>Entering</a:t>
+            </a:r>
+            <a:r>
+              <a:rPr lang="ko-KR" altLang="en-US" sz="1000" dirty="0"/>
+              <a:t> </a:t>
+            </a:r>
+            <a:r>
+              <a:rPr lang="ko-KR" altLang="en-US" sz="1000" dirty="0" err="1"/>
+              <a:t>event</a:t>
+            </a:r>
+            <a:r>
+              <a:rPr lang="ko-KR" altLang="en-US" sz="1000" dirty="0"/>
+              <a:t> </a:t>
+            </a:r>
+            <a:r>
+              <a:rPr lang="ko-KR" altLang="en-US" sz="1000" dirty="0" err="1"/>
+              <a:t>state</a:t>
+            </a:r>
+            <a:r>
+              <a:rPr lang="ko-KR" altLang="en-US" sz="1000" dirty="0"/>
+              <a:t>, </a:t>
+            </a:r>
+            <a:r>
+              <a:rPr lang="ko-KR" altLang="en-US" sz="1000" dirty="0" err="1"/>
+              <a:t>Internal</a:t>
+            </a:r>
+            <a:r>
+              <a:rPr lang="ko-KR" altLang="en-US" sz="1000" dirty="0"/>
+              <a:t> </a:t>
+            </a:r>
+            <a:r>
+              <a:rPr lang="ko-KR" altLang="en-US" sz="1000" dirty="0" err="1"/>
+              <a:t>fault</a:t>
+            </a:r>
+            <a:r>
+              <a:rPr lang="ko-KR" altLang="en-US" sz="1000" dirty="0"/>
+              <a:t> </a:t>
+            </a:r>
+            <a:r>
+              <a:rPr lang="ko-KR" altLang="en-US" sz="1000" dirty="0" err="1"/>
+              <a:t>event</a:t>
+            </a:r>
+            <a:endParaRPr lang="ko-KR" altLang="en-US" sz="1000" dirty="0"/>
+          </a:p>
+          <a:p>
+            <a:r>
+              <a:rPr lang="ko-KR" altLang="en-US" sz="1000" dirty="0"/>
+              <a:t>  OB80_FLT_ID : BYTE ;	//16#XX, </a:t>
+            </a:r>
+            <a:r>
+              <a:rPr lang="ko-KR" altLang="en-US" sz="1000" dirty="0" err="1"/>
+              <a:t>Fault</a:t>
+            </a:r>
+            <a:r>
+              <a:rPr lang="ko-KR" altLang="en-US" sz="1000" dirty="0"/>
+              <a:t> </a:t>
+            </a:r>
+            <a:r>
+              <a:rPr lang="ko-KR" altLang="en-US" sz="1000" dirty="0" err="1"/>
+              <a:t>identifcation</a:t>
+            </a:r>
+            <a:r>
+              <a:rPr lang="ko-KR" altLang="en-US" sz="1000" dirty="0"/>
+              <a:t> </a:t>
+            </a:r>
+            <a:r>
+              <a:rPr lang="ko-KR" altLang="en-US" sz="1000" dirty="0" err="1"/>
+              <a:t>code</a:t>
+            </a:r>
+            <a:endParaRPr lang="ko-KR" altLang="en-US" sz="1000" dirty="0"/>
+          </a:p>
+          <a:p>
+            <a:r>
+              <a:rPr lang="ko-KR" altLang="en-US" sz="1000" dirty="0"/>
+              <a:t>  OB80_PRIORITY : BYTE ;	//</a:t>
+            </a:r>
+            <a:r>
+              <a:rPr lang="ko-KR" altLang="en-US" sz="1000" dirty="0" err="1"/>
+              <a:t>Priority</a:t>
+            </a:r>
+            <a:r>
+              <a:rPr lang="ko-KR" altLang="en-US" sz="1000" dirty="0"/>
+              <a:t> of OB </a:t>
+            </a:r>
+            <a:r>
+              <a:rPr lang="ko-KR" altLang="en-US" sz="1000" dirty="0" err="1"/>
+              <a:t>Execution</a:t>
+            </a:r>
+            <a:endParaRPr lang="ko-KR" altLang="en-US" sz="1000" dirty="0"/>
+          </a:p>
+          <a:p>
+            <a:r>
+              <a:rPr lang="ko-KR" altLang="en-US" sz="1000" dirty="0"/>
+              <a:t>  OB80_OB_NUMBR : BYTE ;	//80 (</a:t>
+            </a:r>
+            <a:r>
+              <a:rPr lang="ko-KR" altLang="en-US" sz="1000" dirty="0" err="1"/>
+              <a:t>Organization</a:t>
+            </a:r>
+            <a:r>
+              <a:rPr lang="ko-KR" altLang="en-US" sz="1000" dirty="0"/>
+              <a:t> </a:t>
+            </a:r>
+            <a:r>
+              <a:rPr lang="ko-KR" altLang="en-US" sz="1000" dirty="0" err="1"/>
+              <a:t>block</a:t>
+            </a:r>
+            <a:r>
+              <a:rPr lang="ko-KR" altLang="en-US" sz="1000" dirty="0"/>
+              <a:t> 80, OB80)</a:t>
+            </a:r>
+          </a:p>
+          <a:p>
+            <a:r>
+              <a:rPr lang="ko-KR" altLang="en-US" sz="1000" dirty="0"/>
+              <a:t>  OB80_RESERVED_1 : BYTE ;	//</a:t>
+            </a:r>
+            <a:r>
+              <a:rPr lang="ko-KR" altLang="en-US" sz="1000" dirty="0" err="1"/>
+              <a:t>Reserved</a:t>
+            </a:r>
+            <a:r>
+              <a:rPr lang="ko-KR" altLang="en-US" sz="1000" dirty="0"/>
+              <a:t> </a:t>
+            </a:r>
+            <a:r>
+              <a:rPr lang="ko-KR" altLang="en-US" sz="1000" dirty="0" err="1"/>
+              <a:t>for</a:t>
+            </a:r>
+            <a:r>
+              <a:rPr lang="ko-KR" altLang="en-US" sz="1000" dirty="0"/>
+              <a:t> </a:t>
+            </a:r>
+            <a:r>
+              <a:rPr lang="ko-KR" altLang="en-US" sz="1000" dirty="0" err="1"/>
+              <a:t>system</a:t>
+            </a:r>
+            <a:endParaRPr lang="ko-KR" altLang="en-US" sz="1000" dirty="0"/>
+          </a:p>
+          <a:p>
+            <a:r>
+              <a:rPr lang="ko-KR" altLang="en-US" sz="1000" dirty="0"/>
+              <a:t>  OB80_RESERVED_2 : BYTE ;	//</a:t>
+            </a:r>
+            <a:r>
+              <a:rPr lang="ko-KR" altLang="en-US" sz="1000" dirty="0" err="1"/>
+              <a:t>Reserved</a:t>
+            </a:r>
+            <a:r>
+              <a:rPr lang="ko-KR" altLang="en-US" sz="1000" dirty="0"/>
+              <a:t> </a:t>
+            </a:r>
+            <a:r>
+              <a:rPr lang="ko-KR" altLang="en-US" sz="1000" dirty="0" err="1"/>
+              <a:t>for</a:t>
+            </a:r>
+            <a:r>
+              <a:rPr lang="ko-KR" altLang="en-US" sz="1000" dirty="0"/>
+              <a:t> </a:t>
+            </a:r>
+            <a:r>
+              <a:rPr lang="ko-KR" altLang="en-US" sz="1000" dirty="0" err="1"/>
+              <a:t>system</a:t>
+            </a:r>
+            <a:endParaRPr lang="ko-KR" altLang="en-US" sz="1000" dirty="0"/>
+          </a:p>
+          <a:p>
+            <a:r>
+              <a:rPr lang="ko-KR" altLang="en-US" sz="1000" dirty="0"/>
+              <a:t>  OB80_ERROR_INFO : WORD ;	//</a:t>
+            </a:r>
+            <a:r>
+              <a:rPr lang="ko-KR" altLang="en-US" sz="1000" dirty="0" err="1"/>
+              <a:t>Error</a:t>
+            </a:r>
+            <a:r>
+              <a:rPr lang="ko-KR" altLang="en-US" sz="1000" dirty="0"/>
+              <a:t> </a:t>
+            </a:r>
+            <a:r>
+              <a:rPr lang="ko-KR" altLang="en-US" sz="1000" dirty="0" err="1"/>
+              <a:t>information</a:t>
+            </a:r>
+            <a:r>
+              <a:rPr lang="ko-KR" altLang="en-US" sz="1000" dirty="0"/>
+              <a:t> </a:t>
+            </a:r>
+            <a:r>
+              <a:rPr lang="ko-KR" altLang="en-US" sz="1000" dirty="0" err="1"/>
+              <a:t>on</a:t>
+            </a:r>
+            <a:r>
+              <a:rPr lang="ko-KR" altLang="en-US" sz="1000" dirty="0"/>
+              <a:t> </a:t>
+            </a:r>
+            <a:r>
+              <a:rPr lang="ko-KR" altLang="en-US" sz="1000" dirty="0" err="1"/>
+              <a:t>event</a:t>
+            </a:r>
+            <a:endParaRPr lang="ko-KR" altLang="en-US" sz="1000" dirty="0"/>
+          </a:p>
+          <a:p>
+            <a:r>
+              <a:rPr lang="ko-KR" altLang="en-US" sz="1000" dirty="0"/>
+              <a:t>  OB80_ERR_EV_CLASS : BYTE ;	//</a:t>
+            </a:r>
+            <a:r>
+              <a:rPr lang="ko-KR" altLang="en-US" sz="1000" dirty="0" err="1"/>
+              <a:t>Class</a:t>
+            </a:r>
+            <a:r>
+              <a:rPr lang="ko-KR" altLang="en-US" sz="1000" dirty="0"/>
+              <a:t> of </a:t>
+            </a:r>
+            <a:r>
+              <a:rPr lang="ko-KR" altLang="en-US" sz="1000" dirty="0" err="1"/>
+              <a:t>event</a:t>
+            </a:r>
+            <a:r>
+              <a:rPr lang="ko-KR" altLang="en-US" sz="1000" dirty="0"/>
+              <a:t> </a:t>
+            </a:r>
+            <a:r>
+              <a:rPr lang="ko-KR" altLang="en-US" sz="1000" dirty="0" err="1"/>
+              <a:t>causing</a:t>
+            </a:r>
+            <a:r>
+              <a:rPr lang="ko-KR" altLang="en-US" sz="1000" dirty="0"/>
+              <a:t> </a:t>
+            </a:r>
+            <a:r>
+              <a:rPr lang="ko-KR" altLang="en-US" sz="1000" dirty="0" err="1"/>
+              <a:t>error</a:t>
+            </a:r>
+            <a:endParaRPr lang="ko-KR" altLang="en-US" sz="1000" dirty="0"/>
+          </a:p>
+          <a:p>
+            <a:r>
+              <a:rPr lang="ko-KR" altLang="en-US" sz="1000" dirty="0"/>
+              <a:t>  OB80_ERR_EV_NUM : BYTE ;	//</a:t>
+            </a:r>
+            <a:r>
+              <a:rPr lang="ko-KR" altLang="en-US" sz="1000" dirty="0" err="1"/>
+              <a:t>Number</a:t>
+            </a:r>
+            <a:r>
+              <a:rPr lang="ko-KR" altLang="en-US" sz="1000" dirty="0"/>
+              <a:t> of </a:t>
+            </a:r>
+            <a:r>
+              <a:rPr lang="ko-KR" altLang="en-US" sz="1000" dirty="0" err="1"/>
+              <a:t>event</a:t>
+            </a:r>
+            <a:r>
+              <a:rPr lang="ko-KR" altLang="en-US" sz="1000" dirty="0"/>
+              <a:t> </a:t>
+            </a:r>
+            <a:r>
+              <a:rPr lang="ko-KR" altLang="en-US" sz="1000" dirty="0" err="1"/>
+              <a:t>causing</a:t>
+            </a:r>
+            <a:r>
+              <a:rPr lang="ko-KR" altLang="en-US" sz="1000" dirty="0"/>
+              <a:t> </a:t>
+            </a:r>
+            <a:r>
+              <a:rPr lang="ko-KR" altLang="en-US" sz="1000" dirty="0" err="1"/>
+              <a:t>error</a:t>
+            </a:r>
+            <a:endParaRPr lang="ko-KR" altLang="en-US" sz="1000" dirty="0"/>
+          </a:p>
+          <a:p>
+            <a:r>
+              <a:rPr lang="ko-KR" altLang="en-US" sz="1000" dirty="0"/>
+              <a:t>  OB80_OB_PRIORITY : BYTE ;	//</a:t>
+            </a:r>
+            <a:r>
+              <a:rPr lang="ko-KR" altLang="en-US" sz="1000" dirty="0" err="1"/>
+              <a:t>Priority</a:t>
+            </a:r>
+            <a:r>
+              <a:rPr lang="ko-KR" altLang="en-US" sz="1000" dirty="0"/>
+              <a:t> of OB </a:t>
+            </a:r>
+            <a:r>
+              <a:rPr lang="ko-KR" altLang="en-US" sz="1000" dirty="0" err="1"/>
+              <a:t>causing</a:t>
+            </a:r>
+            <a:r>
+              <a:rPr lang="ko-KR" altLang="en-US" sz="1000" dirty="0"/>
+              <a:t> </a:t>
+            </a:r>
+            <a:r>
+              <a:rPr lang="ko-KR" altLang="en-US" sz="1000" dirty="0" err="1"/>
+              <a:t>error</a:t>
+            </a:r>
+            <a:endParaRPr lang="ko-KR" altLang="en-US" sz="1000" dirty="0"/>
+          </a:p>
+          <a:p>
+            <a:r>
+              <a:rPr lang="ko-KR" altLang="en-US" sz="1000" dirty="0"/>
+              <a:t>  OB80_OB_NUM : BYTE ;	//</a:t>
+            </a:r>
+            <a:r>
+              <a:rPr lang="ko-KR" altLang="en-US" sz="1000" dirty="0" err="1"/>
+              <a:t>Number</a:t>
+            </a:r>
+            <a:r>
+              <a:rPr lang="ko-KR" altLang="en-US" sz="1000" dirty="0"/>
+              <a:t> of OB </a:t>
+            </a:r>
+            <a:r>
+              <a:rPr lang="ko-KR" altLang="en-US" sz="1000" dirty="0" err="1"/>
+              <a:t>causing</a:t>
+            </a:r>
+            <a:r>
+              <a:rPr lang="ko-KR" altLang="en-US" sz="1000" dirty="0"/>
+              <a:t> </a:t>
+            </a:r>
+            <a:r>
+              <a:rPr lang="ko-KR" altLang="en-US" sz="1000" dirty="0" err="1"/>
+              <a:t>error</a:t>
+            </a:r>
+            <a:endParaRPr lang="ko-KR" altLang="en-US" sz="1000" dirty="0"/>
+          </a:p>
+          <a:p>
+            <a:r>
+              <a:rPr lang="ko-KR" altLang="en-US" sz="1000" dirty="0"/>
+              <a:t>  OB80_DATE_TIME : DATE_AND_TIME ;	//</a:t>
+            </a:r>
+            <a:r>
+              <a:rPr lang="ko-KR" altLang="en-US" sz="1000" dirty="0" err="1"/>
+              <a:t>Date</a:t>
+            </a:r>
+            <a:r>
+              <a:rPr lang="ko-KR" altLang="en-US" sz="1000" dirty="0"/>
+              <a:t> and </a:t>
+            </a:r>
+            <a:r>
+              <a:rPr lang="ko-KR" altLang="en-US" sz="1000" dirty="0" err="1"/>
+              <a:t>time</a:t>
+            </a:r>
+            <a:r>
+              <a:rPr lang="ko-KR" altLang="en-US" sz="1000" dirty="0"/>
+              <a:t> OB80 </a:t>
+            </a:r>
+            <a:r>
+              <a:rPr lang="ko-KR" altLang="en-US" sz="1000" dirty="0" err="1"/>
+              <a:t>started</a:t>
+            </a:r>
+            <a:r>
+              <a:rPr lang="ko-KR" altLang="en-US" sz="1000" dirty="0"/>
+              <a:t>   </a:t>
+            </a:r>
+          </a:p>
+          <a:p>
+            <a:r>
+              <a:rPr lang="ko-KR" altLang="en-US" sz="1000" dirty="0"/>
+              <a:t>END_VAR</a:t>
+            </a:r>
+          </a:p>
+          <a:p>
+            <a:r>
+              <a:rPr lang="ko-KR" altLang="en-US" sz="1000" dirty="0"/>
+              <a:t>BEGIN</a:t>
+            </a:r>
+          </a:p>
+          <a:p>
+            <a:r>
+              <a:rPr lang="ko-KR" altLang="en-US" sz="1000" dirty="0"/>
+              <a:t>NETWORK</a:t>
+            </a:r>
+          </a:p>
+          <a:p>
+            <a:r>
+              <a:rPr lang="ko-KR" altLang="en-US" sz="1000" dirty="0"/>
+              <a:t>TITLE =</a:t>
+            </a:r>
+          </a:p>
+          <a:p>
+            <a:endParaRPr lang="ko-KR" altLang="en-US" sz="1000" dirty="0"/>
+          </a:p>
+          <a:p>
+            <a:r>
+              <a:rPr lang="ko-KR" altLang="en-US" sz="1000" dirty="0"/>
+              <a:t>END_ORGANIZATION_BLOCK</a:t>
             </a:r>
           </a:p>
         </p:txBody>
@@ -5021,7 +5013,7 @@
     </p:custDataLst>
     <p:extLst>
       <p:ext uri="{BB962C8B-B14F-4D97-AF65-F5344CB8AC3E}">
-        <p14:creationId xmlns:p14="http://schemas.microsoft.com/office/powerpoint/2010/main" val="1286673020"/>
+        <p14:creationId xmlns:p14="http://schemas.microsoft.com/office/powerpoint/2010/main" val="690715674"/>
       </p:ext>
     </p:extLst>
   </p:cSld>
@@ -5053,7 +5045,7 @@
           <p:cNvPr id="2" name="제목 1">
             <a:extLst>
               <a:ext uri="{FF2B5EF4-FFF2-40B4-BE49-F238E27FC236}">
-                <a16:creationId xmlns:a16="http://schemas.microsoft.com/office/drawing/2014/main" id="{E84CA190-8FDF-E5EC-13DE-DFCEE31A01DC}"/>
+                <a16:creationId xmlns:a16="http://schemas.microsoft.com/office/drawing/2014/main" id="{875077B2-B955-EF16-1EB5-C5DCCE550135}"/>
               </a:ext>
             </a:extLst>
           </p:cNvPr>
@@ -5071,7 +5063,7 @@
           <a:p>
             <a:r>
               <a:rPr lang="en-US" altLang="ko-KR" dirty="0"/>
-              <a:t>Resources</a:t>
+              <a:t>*.SDF</a:t>
             </a:r>
             <a:endParaRPr lang="ko-KR" altLang="en-US" dirty="0"/>
           </a:p>
@@ -5082,7 +5074,7 @@
           <p:cNvPr id="3" name="내용 개체 틀 2">
             <a:extLst>
               <a:ext uri="{FF2B5EF4-FFF2-40B4-BE49-F238E27FC236}">
-                <a16:creationId xmlns:a16="http://schemas.microsoft.com/office/drawing/2014/main" id="{8BD6ECA9-3459-9147-D076-D89C859D83E4}"/>
+                <a16:creationId xmlns:a16="http://schemas.microsoft.com/office/drawing/2014/main" id="{75DC9B40-D6A9-EAB5-F30E-7D78FC6BC3C9}"/>
               </a:ext>
             </a:extLst>
           </p:cNvPr>
@@ -5093,57 +5085,454 @@
             <p:ph idx="1"/>
           </p:nvPr>
         </p:nvSpPr>
+        <p:spPr>
+          <a:xfrm>
+            <a:off x="5654180" y="1825625"/>
+            <a:ext cx="5699620" cy="4351338"/>
+          </a:xfrm>
+        </p:spPr>
+        <p:txBody>
+          <a:bodyPr/>
+          <a:lstStyle/>
+          <a:p>
+            <a:r>
+              <a:rPr lang="en-US" altLang="ko-KR" dirty="0"/>
+              <a:t>“Field1”, “Filed2”, … </a:t>
+            </a:r>
+            <a:r>
+              <a:rPr lang="ko-KR" altLang="en-US" dirty="0"/>
+              <a:t>형태</a:t>
+            </a:r>
+          </a:p>
+          <a:p>
+            <a:r>
+              <a:rPr lang="en-US" altLang="ko-KR" dirty="0"/>
+              <a:t>‘,’ </a:t>
+            </a:r>
+            <a:r>
+              <a:rPr lang="ko-KR" altLang="en-US" dirty="0"/>
+              <a:t>구분자로 </a:t>
+            </a:r>
+            <a:r>
+              <a:rPr lang="en-US" altLang="ko-KR" dirty="0"/>
+              <a:t>text parsing </a:t>
+            </a:r>
+            <a:r>
+              <a:rPr lang="ko-KR" altLang="en-US" dirty="0"/>
+              <a:t>해도 될 듯</a:t>
+            </a:r>
+            <a:r>
+              <a:rPr lang="en-US" altLang="ko-KR" dirty="0"/>
+              <a:t>.   Column </a:t>
+            </a:r>
+            <a:r>
+              <a:rPr lang="ko-KR" altLang="en-US" dirty="0"/>
+              <a:t>에 </a:t>
+            </a:r>
+            <a:r>
+              <a:rPr lang="en-US" altLang="ko-KR" dirty="0"/>
+              <a:t>‘,’ </a:t>
+            </a:r>
+            <a:r>
+              <a:rPr lang="ko-KR" altLang="en-US" dirty="0"/>
+              <a:t>포함하는 경우의 형태 파악 필요</a:t>
+            </a:r>
+            <a:endParaRPr lang="en-US" altLang="ko-KR" dirty="0"/>
+          </a:p>
+        </p:txBody>
+      </p:sp>
+      <p:sp>
+        <p:nvSpPr>
+          <p:cNvPr id="5" name="TextBox 4">
+            <a:extLst>
+              <a:ext uri="{FF2B5EF4-FFF2-40B4-BE49-F238E27FC236}">
+                <a16:creationId xmlns:a16="http://schemas.microsoft.com/office/drawing/2014/main" id="{6A16D061-9980-ECA9-8FFE-A3EDCDCC4525}"/>
+              </a:ext>
+            </a:extLst>
+          </p:cNvPr>
+          <p:cNvSpPr txBox="1"/>
+          <p:nvPr/>
+        </p:nvSpPr>
+        <p:spPr>
+          <a:xfrm>
+            <a:off x="656128" y="2123349"/>
+            <a:ext cx="4175932" cy="2092881"/>
+          </a:xfrm>
+          <a:prstGeom prst="rect">
+            <a:avLst/>
+          </a:prstGeom>
+          <a:noFill/>
+        </p:spPr>
+        <p:txBody>
+          <a:bodyPr wrap="square">
+            <a:spAutoFit/>
+          </a:bodyPr>
+          <a:lstStyle/>
+          <a:p>
+            <a:r>
+              <a:rPr lang="en-US" altLang="ko-KR" sz="1000" dirty="0"/>
+              <a:t>"#13 T </a:t>
+            </a:r>
+            <a:r>
+              <a:rPr lang="ko-KR" altLang="en-US" sz="1000" dirty="0" err="1"/>
+              <a:t>부저정지지연</a:t>
+            </a:r>
+            <a:r>
+              <a:rPr lang="ko-KR" altLang="en-US" sz="1000" dirty="0"/>
+              <a:t>      </a:t>
+            </a:r>
+            <a:r>
+              <a:rPr lang="en-US" altLang="ko-KR" sz="1000" dirty="0"/>
+              <a:t>",  "T      99   ",  "TIMER     ",    "        "</a:t>
+            </a:r>
+          </a:p>
+          <a:p>
+            <a:r>
+              <a:rPr lang="en-US" altLang="ko-KR" sz="1000" dirty="0"/>
+              <a:t>"#708-1 DP1 10</a:t>
+            </a:r>
+            <a:r>
+              <a:rPr lang="ko-KR" altLang="en-US" sz="1000" dirty="0" err="1"/>
+              <a:t>국이상</a:t>
+            </a:r>
+            <a:r>
+              <a:rPr lang="ko-KR" altLang="en-US" sz="1000" dirty="0"/>
+              <a:t>     </a:t>
+            </a:r>
+            <a:r>
+              <a:rPr lang="en-US" altLang="ko-KR" sz="1000" dirty="0"/>
+              <a:t>","M     981.1 ","BOOL      ","        "</a:t>
+            </a:r>
+          </a:p>
+          <a:p>
+            <a:r>
+              <a:rPr lang="en-US" altLang="ko-KR" sz="1000" dirty="0"/>
+              <a:t>"#708-1 DP1 11</a:t>
+            </a:r>
+            <a:r>
+              <a:rPr lang="ko-KR" altLang="en-US" sz="1000" dirty="0" err="1"/>
+              <a:t>국이상</a:t>
+            </a:r>
+            <a:r>
+              <a:rPr lang="ko-KR" altLang="en-US" sz="1000" dirty="0"/>
+              <a:t>     </a:t>
+            </a:r>
+            <a:r>
+              <a:rPr lang="en-US" altLang="ko-KR" sz="1000" dirty="0"/>
+              <a:t>","M     981.2 ","BOOL      ","        "</a:t>
+            </a:r>
+          </a:p>
+          <a:p>
+            <a:r>
+              <a:rPr lang="en-US" altLang="ko-KR" sz="1000" dirty="0"/>
+              <a:t>"#708-1 DP1 12</a:t>
+            </a:r>
+            <a:r>
+              <a:rPr lang="ko-KR" altLang="en-US" sz="1000" dirty="0" err="1"/>
+              <a:t>국이상</a:t>
+            </a:r>
+            <a:r>
+              <a:rPr lang="ko-KR" altLang="en-US" sz="1000" dirty="0"/>
+              <a:t>     </a:t>
+            </a:r>
+            <a:r>
+              <a:rPr lang="en-US" altLang="ko-KR" sz="1000" dirty="0"/>
+              <a:t>","M     981.3 ","BOOL      ","        "</a:t>
+            </a:r>
+          </a:p>
+          <a:p>
+            <a:r>
+              <a:rPr lang="en-US" altLang="ko-KR" sz="1000" dirty="0"/>
+              <a:t>"#708-1 DP1 13</a:t>
+            </a:r>
+            <a:r>
+              <a:rPr lang="ko-KR" altLang="en-US" sz="1000" dirty="0" err="1"/>
+              <a:t>국이상</a:t>
+            </a:r>
+            <a:r>
+              <a:rPr lang="ko-KR" altLang="en-US" sz="1000" dirty="0"/>
+              <a:t>     </a:t>
+            </a:r>
+            <a:r>
+              <a:rPr lang="en-US" altLang="ko-KR" sz="1000" dirty="0"/>
+              <a:t>","M     981.4 ","BOOL      ","        "</a:t>
+            </a:r>
+          </a:p>
+          <a:p>
+            <a:r>
+              <a:rPr lang="en-US" altLang="ko-KR" sz="1000" dirty="0"/>
+              <a:t>"#708-1 DP1 14</a:t>
+            </a:r>
+            <a:r>
+              <a:rPr lang="ko-KR" altLang="en-US" sz="1000" dirty="0" err="1"/>
+              <a:t>국이상</a:t>
+            </a:r>
+            <a:r>
+              <a:rPr lang="ko-KR" altLang="en-US" sz="1000" dirty="0"/>
+              <a:t>     </a:t>
+            </a:r>
+            <a:r>
+              <a:rPr lang="en-US" altLang="ko-KR" sz="1000" dirty="0"/>
+              <a:t>","M     981.5 ","BOOL      ","        "</a:t>
+            </a:r>
+          </a:p>
+          <a:p>
+            <a:r>
+              <a:rPr lang="en-US" altLang="ko-KR" sz="1000" dirty="0"/>
+              <a:t>"#708-1 DP1 15</a:t>
+            </a:r>
+            <a:r>
+              <a:rPr lang="ko-KR" altLang="en-US" sz="1000" dirty="0" err="1"/>
+              <a:t>국이상</a:t>
+            </a:r>
+            <a:r>
+              <a:rPr lang="ko-KR" altLang="en-US" sz="1000" dirty="0"/>
+              <a:t>     </a:t>
+            </a:r>
+            <a:r>
+              <a:rPr lang="en-US" altLang="ko-KR" sz="1000" dirty="0"/>
+              <a:t>","M     981.6 ","BOOL      ","        "</a:t>
+            </a:r>
+          </a:p>
+          <a:p>
+            <a:r>
+              <a:rPr lang="en-US" altLang="ko-KR" sz="1000" dirty="0"/>
+              <a:t>"#708-1 DP1 16</a:t>
+            </a:r>
+            <a:r>
+              <a:rPr lang="ko-KR" altLang="en-US" sz="1000" dirty="0" err="1"/>
+              <a:t>국이상</a:t>
+            </a:r>
+            <a:r>
+              <a:rPr lang="ko-KR" altLang="en-US" sz="1000" dirty="0"/>
+              <a:t>     </a:t>
+            </a:r>
+            <a:r>
+              <a:rPr lang="en-US" altLang="ko-KR" sz="1000" dirty="0"/>
+              <a:t>","M     981.7 ","BOOL      ","        "</a:t>
+            </a:r>
+          </a:p>
+          <a:p>
+            <a:r>
+              <a:rPr lang="en-US" altLang="ko-KR" sz="1000" dirty="0"/>
+              <a:t>"#708-1 DP1 1</a:t>
+            </a:r>
+            <a:r>
+              <a:rPr lang="ko-KR" altLang="en-US" sz="1000" dirty="0" err="1"/>
+              <a:t>국이상</a:t>
+            </a:r>
+            <a:r>
+              <a:rPr lang="ko-KR" altLang="en-US" sz="1000" dirty="0"/>
+              <a:t>      </a:t>
+            </a:r>
+            <a:r>
+              <a:rPr lang="en-US" altLang="ko-KR" sz="1000" dirty="0"/>
+              <a:t>","M     980.0 ","BOOL      ","        "</a:t>
+            </a:r>
+          </a:p>
+          <a:p>
+            <a:r>
+              <a:rPr lang="en-US" altLang="ko-KR" sz="1000" dirty="0"/>
+              <a:t>"#708-1 DP1 2</a:t>
+            </a:r>
+            <a:r>
+              <a:rPr lang="ko-KR" altLang="en-US" sz="1000" dirty="0" err="1"/>
+              <a:t>국이상</a:t>
+            </a:r>
+            <a:r>
+              <a:rPr lang="ko-KR" altLang="en-US" sz="1000" dirty="0"/>
+              <a:t>      </a:t>
+            </a:r>
+            <a:r>
+              <a:rPr lang="en-US" altLang="ko-KR" sz="1000" dirty="0"/>
+              <a:t>","M     980.1 ","BOOL      ","        "</a:t>
+            </a:r>
+          </a:p>
+          <a:p>
+            <a:r>
+              <a:rPr lang="en-US" altLang="ko-KR" sz="1000" dirty="0"/>
+              <a:t>"#708-1 DP1 3</a:t>
+            </a:r>
+            <a:r>
+              <a:rPr lang="ko-KR" altLang="en-US" sz="1000" dirty="0" err="1"/>
+              <a:t>국이상</a:t>
+            </a:r>
+            <a:r>
+              <a:rPr lang="ko-KR" altLang="en-US" sz="1000" dirty="0"/>
+              <a:t>      </a:t>
+            </a:r>
+            <a:r>
+              <a:rPr lang="en-US" altLang="ko-KR" sz="1000" dirty="0"/>
+              <a:t>","M     980.2 ","BOOL      ","        "</a:t>
+            </a:r>
+          </a:p>
+          <a:p>
+            <a:r>
+              <a:rPr lang="en-US" altLang="ko-KR" sz="1000" dirty="0"/>
+              <a:t>"#708-1 DP1 4</a:t>
+            </a:r>
+            <a:r>
+              <a:rPr lang="ko-KR" altLang="en-US" sz="1000" dirty="0" err="1"/>
+              <a:t>국이상</a:t>
+            </a:r>
+            <a:r>
+              <a:rPr lang="ko-KR" altLang="en-US" sz="1000" dirty="0"/>
+              <a:t>      </a:t>
+            </a:r>
+            <a:r>
+              <a:rPr lang="en-US" altLang="ko-KR" sz="1000" dirty="0"/>
+              <a:t>","M     980.3 ","BOOL      ","        "</a:t>
+            </a:r>
+          </a:p>
+          <a:p>
+            <a:r>
+              <a:rPr lang="en-US" altLang="ko-KR" sz="1000" dirty="0"/>
+              <a:t>"#708-1 DP1 5</a:t>
+            </a:r>
+            <a:r>
+              <a:rPr lang="ko-KR" altLang="en-US" sz="1000" dirty="0" err="1"/>
+              <a:t>국이상</a:t>
+            </a:r>
+            <a:r>
+              <a:rPr lang="ko-KR" altLang="en-US" sz="1000" dirty="0"/>
+              <a:t>      </a:t>
+            </a:r>
+            <a:r>
+              <a:rPr lang="en-US" altLang="ko-KR" sz="1000" dirty="0"/>
+              <a:t>","M     980.4 ","BOOL      ","        "</a:t>
+            </a:r>
+          </a:p>
+        </p:txBody>
+      </p:sp>
+    </p:spTree>
+    <p:custDataLst>
+      <p:tags r:id="rId1"/>
+    </p:custDataLst>
+    <p:extLst>
+      <p:ext uri="{BB962C8B-B14F-4D97-AF65-F5344CB8AC3E}">
+        <p14:creationId xmlns:p14="http://schemas.microsoft.com/office/powerpoint/2010/main" val="1286673020"/>
+      </p:ext>
+    </p:extLst>
+  </p:cSld>
+  <p:clrMapOvr>
+    <a:masterClrMapping/>
+  </p:clrMapOvr>
+</p:sld>
+</file>
+
+<file path=ppt/slides/slide14.xml><?xml version="1.0" encoding="utf-8"?>
+<p:sld xmlns:a="http://schemas.openxmlformats.org/drawingml/2006/main" xmlns:r="http://schemas.openxmlformats.org/officeDocument/2006/relationships" xmlns:p="http://schemas.openxmlformats.org/presentationml/2006/main">
+  <p:cSld>
+    <p:spTree>
+      <p:nvGrpSpPr>
+        <p:cNvPr id="1" name=""/>
+        <p:cNvGrpSpPr/>
+        <p:nvPr/>
+      </p:nvGrpSpPr>
+      <p:grpSpPr>
+        <a:xfrm>
+          <a:off x="0" y="0"/>
+          <a:ext cx="0" cy="0"/>
+          <a:chOff x="0" y="0"/>
+          <a:chExt cx="0" cy="0"/>
+        </a:xfrm>
+      </p:grpSpPr>
+      <p:sp>
+        <p:nvSpPr>
+          <p:cNvPr id="2" name="제목 1">
+            <a:extLst>
+              <a:ext uri="{FF2B5EF4-FFF2-40B4-BE49-F238E27FC236}">
+                <a16:creationId xmlns:a16="http://schemas.microsoft.com/office/drawing/2014/main" id="{E84CA190-8FDF-E5EC-13DE-DFCEE31A01DC}"/>
+              </a:ext>
+            </a:extLst>
+          </p:cNvPr>
+          <p:cNvSpPr>
+            <a:spLocks noGrp="1"/>
+          </p:cNvSpPr>
+          <p:nvPr>
+            <p:ph type="title"/>
+          </p:nvPr>
+        </p:nvSpPr>
         <p:spPr/>
         <p:txBody>
           <a:bodyPr/>
           <a:lstStyle/>
           <a:p>
             <a:r>
-              <a:rPr lang="en-US" altLang="ko-KR" dirty="0">
-                <a:hlinkClick r:id="rId2"/>
-              </a:rPr>
-              <a:t>https://github.com/tallakt/awltool</a:t>
-            </a:r>
-            <a:endParaRPr lang="en-US" altLang="ko-KR" dirty="0"/>
-          </a:p>
-          <a:p>
-            <a:pPr lvl="1"/>
-            <a:r>
               <a:rPr lang="en-US" altLang="ko-KR" dirty="0"/>
-              <a:t>Ruby </a:t>
-            </a:r>
-            <a:r>
-              <a:rPr lang="ko-KR" altLang="en-US" dirty="0"/>
-              <a:t>기반 </a:t>
-            </a:r>
-            <a:r>
-              <a:rPr lang="en-US" altLang="ko-KR" dirty="0"/>
-              <a:t>awl parser</a:t>
-            </a:r>
-          </a:p>
-          <a:p>
-            <a:r>
-              <a:rPr lang="en-US" altLang="ko-KR" b="1" dirty="0"/>
-              <a:t>A</a:t>
-            </a:r>
-            <a:r>
-              <a:rPr lang="en-US" altLang="ko-KR" dirty="0"/>
-              <a:t>utomation </a:t>
-            </a:r>
-            <a:r>
-              <a:rPr lang="en-US" altLang="ko-KR" b="1" dirty="0"/>
-              <a:t>W</a:t>
-            </a:r>
-            <a:r>
-              <a:rPr lang="en-US" altLang="ko-KR" dirty="0"/>
-              <a:t>orkbench</a:t>
-            </a:r>
-          </a:p>
+              <a:t>Resources</a:t>
+            </a:r>
+            <a:endParaRPr lang="ko-KR" altLang="en-US" dirty="0"/>
+          </a:p>
+        </p:txBody>
+      </p:sp>
+      <p:sp>
+        <p:nvSpPr>
+          <p:cNvPr id="3" name="내용 개체 틀 2">
+            <a:extLst>
+              <a:ext uri="{FF2B5EF4-FFF2-40B4-BE49-F238E27FC236}">
+                <a16:creationId xmlns:a16="http://schemas.microsoft.com/office/drawing/2014/main" id="{8BD6ECA9-3459-9147-D076-D89C859D83E4}"/>
+              </a:ext>
+            </a:extLst>
+          </p:cNvPr>
+          <p:cNvSpPr>
+            <a:spLocks noGrp="1"/>
+          </p:cNvSpPr>
+          <p:nvPr>
+            <p:ph idx="1"/>
+          </p:nvPr>
+        </p:nvSpPr>
+        <p:spPr/>
+        <p:txBody>
+          <a:bodyPr/>
+          <a:lstStyle/>
           <a:p>
             <a:r>
               <a:rPr lang="en-US" altLang="ko-KR" dirty="0">
                 <a:hlinkClick r:id="rId3"/>
               </a:rPr>
+              <a:t>https://github.com/tallakt/awltool</a:t>
+            </a:r>
+            <a:endParaRPr lang="en-US" altLang="ko-KR" dirty="0"/>
+          </a:p>
+          <a:p>
+            <a:pPr lvl="1"/>
+            <a:r>
+              <a:rPr lang="en-US" altLang="ko-KR" dirty="0"/>
+              <a:t>Ruby </a:t>
+            </a:r>
+            <a:r>
+              <a:rPr lang="ko-KR" altLang="en-US" dirty="0"/>
+              <a:t>기반 </a:t>
+            </a:r>
+            <a:r>
+              <a:rPr lang="en-US" altLang="ko-KR" dirty="0"/>
+              <a:t>awl parser</a:t>
+            </a:r>
+          </a:p>
+          <a:p>
+            <a:r>
+              <a:rPr lang="en-US" altLang="ko-KR" b="1" dirty="0"/>
+              <a:t>A</a:t>
+            </a:r>
+            <a:r>
+              <a:rPr lang="en-US" altLang="ko-KR" dirty="0"/>
+              <a:t>utomation </a:t>
+            </a:r>
+            <a:r>
+              <a:rPr lang="en-US" altLang="ko-KR" b="1" dirty="0"/>
+              <a:t>W</a:t>
+            </a:r>
+            <a:r>
+              <a:rPr lang="en-US" altLang="ko-KR" dirty="0"/>
+              <a:t>orkbench</a:t>
+            </a:r>
+          </a:p>
+          <a:p>
+            <a:r>
+              <a:rPr lang="en-US" altLang="ko-KR" dirty="0">
+                <a:hlinkClick r:id="rId4"/>
+              </a:rPr>
               <a:t>https://dl.weintek.com/public/PLC_Connect_Guide/Siemens_S7_300_ET200S_Ethernet.pdf</a:t>
             </a:r>
             <a:endParaRPr lang="en-US" altLang="ko-KR" dirty="0"/>
@@ -5195,6 +5584,9 @@
         </p:txBody>
       </p:sp>
     </p:spTree>
+    <p:custDataLst>
+      <p:tags r:id="rId1"/>
+    </p:custDataLst>
     <p:extLst>
       <p:ext uri="{BB962C8B-B14F-4D97-AF65-F5344CB8AC3E}">
         <p14:creationId xmlns:p14="http://schemas.microsoft.com/office/powerpoint/2010/main" val="3430638139"/>
@@ -6551,18 +6943,18 @@
           <a:lstStyle/>
           <a:p>
             <a:r>
-              <a:rPr lang="en-US" altLang="ko-KR" dirty="0"/>
+              <a:rPr lang="en-US" altLang="ko-KR" strike="sngStrike" dirty="0"/>
               <a:t>Developer</a:t>
             </a:r>
             <a:r>
-              <a:rPr lang="ko-KR" altLang="en-US" dirty="0"/>
+              <a:rPr lang="ko-KR" altLang="en-US" strike="sngStrike" dirty="0"/>
               <a:t> </a:t>
             </a:r>
             <a:r>
-              <a:rPr lang="ko-KR" altLang="en-US" dirty="0" err="1"/>
+              <a:rPr lang="ko-KR" altLang="en-US" strike="sngStrike" dirty="0" err="1"/>
               <a:t>버젼</a:t>
             </a:r>
-            <a:endParaRPr lang="ko-KR" altLang="en-US" dirty="0"/>
+            <a:endParaRPr lang="ko-KR" altLang="en-US" strike="sngStrike" dirty="0"/>
           </a:p>
         </p:txBody>
       </p:sp>
@@ -9363,6 +9755,103 @@
   <p:cSld>
     <p:spTree>
       <p:nvGrpSpPr>
+        <p:cNvPr id="1" name=""/>
+        <p:cNvGrpSpPr/>
+        <p:nvPr/>
+      </p:nvGrpSpPr>
+      <p:grpSpPr>
+        <a:xfrm>
+          <a:off x="0" y="0"/>
+          <a:ext cx="0" cy="0"/>
+          <a:chOff x="0" y="0"/>
+          <a:chExt cx="0" cy="0"/>
+        </a:xfrm>
+      </p:grpSpPr>
+      <p:sp>
+        <p:nvSpPr>
+          <p:cNvPr id="2" name="제목 1">
+            <a:extLst>
+              <a:ext uri="{FF2B5EF4-FFF2-40B4-BE49-F238E27FC236}">
+                <a16:creationId xmlns:a16="http://schemas.microsoft.com/office/drawing/2014/main" id="{A7FD7EDA-5FA6-3C32-D966-E30BCD7E9011}"/>
+              </a:ext>
+            </a:extLst>
+          </p:cNvPr>
+          <p:cNvSpPr>
+            <a:spLocks noGrp="1"/>
+          </p:cNvSpPr>
+          <p:nvPr>
+            <p:ph type="title"/>
+          </p:nvPr>
+        </p:nvSpPr>
+        <p:spPr/>
+        <p:txBody>
+          <a:bodyPr/>
+          <a:lstStyle/>
+          <a:p>
+            <a:r>
+              <a:rPr lang="en-US" altLang="ko-KR" dirty="0"/>
+              <a:t>Resources</a:t>
+            </a:r>
+            <a:endParaRPr lang="ko-KR" altLang="en-US" dirty="0"/>
+          </a:p>
+        </p:txBody>
+      </p:sp>
+      <p:sp>
+        <p:nvSpPr>
+          <p:cNvPr id="3" name="내용 개체 틀 2">
+            <a:extLst>
+              <a:ext uri="{FF2B5EF4-FFF2-40B4-BE49-F238E27FC236}">
+                <a16:creationId xmlns:a16="http://schemas.microsoft.com/office/drawing/2014/main" id="{68BCDE90-36C5-7537-BEB9-CB9EB4C2AABB}"/>
+              </a:ext>
+            </a:extLst>
+          </p:cNvPr>
+          <p:cNvSpPr>
+            <a:spLocks noGrp="1"/>
+          </p:cNvSpPr>
+          <p:nvPr>
+            <p:ph idx="1"/>
+          </p:nvPr>
+        </p:nvSpPr>
+        <p:spPr/>
+        <p:txBody>
+          <a:bodyPr/>
+          <a:lstStyle/>
+          <a:p>
+            <a:r>
+              <a:rPr lang="en-US" altLang="ko-KR" dirty="0">
+                <a:hlinkClick r:id="rId2"/>
+              </a:rPr>
+              <a:t>https://literature.rockwellautomation.com/idc/groups/literature/documents/pm/1756-pm004_-en-p.pdf</a:t>
+            </a:r>
+            <a:endParaRPr lang="en-US" altLang="ko-KR" dirty="0"/>
+          </a:p>
+          <a:p>
+            <a:r>
+              <a:rPr lang="en-US" altLang="ko-KR"/>
+              <a:t>https://literature.rockwellautomation.com/idc/groups/literature/documents/pm/1756-pm021_-en-p.pdf</a:t>
+            </a:r>
+            <a:endParaRPr lang="ko-KR" altLang="en-US" dirty="0"/>
+          </a:p>
+        </p:txBody>
+      </p:sp>
+    </p:spTree>
+    <p:extLst>
+      <p:ext uri="{BB962C8B-B14F-4D97-AF65-F5344CB8AC3E}">
+        <p14:creationId xmlns:p14="http://schemas.microsoft.com/office/powerpoint/2010/main" val="4242757101"/>
+      </p:ext>
+    </p:extLst>
+  </p:cSld>
+  <p:clrMapOvr>
+    <a:masterClrMapping/>
+  </p:clrMapOvr>
+</p:sld>
+</file>
+
+<file path=ppt/slides/slide9.xml><?xml version="1.0" encoding="utf-8"?>
+<p:sld xmlns:a="http://schemas.openxmlformats.org/drawingml/2006/main" xmlns:r="http://schemas.openxmlformats.org/officeDocument/2006/relationships" xmlns:p="http://schemas.openxmlformats.org/presentationml/2006/main">
+  <p:cSld>
+    <p:spTree>
+      <p:nvGrpSpPr>
         <p:cNvPr id="1" name="">
           <a:extLst>
             <a:ext uri="{FF2B5EF4-FFF2-40B4-BE49-F238E27FC236}">
@@ -9454,394 +9943,6 @@
     <p:extLst>
       <p:ext uri="{BB962C8B-B14F-4D97-AF65-F5344CB8AC3E}">
         <p14:creationId xmlns:p14="http://schemas.microsoft.com/office/powerpoint/2010/main" val="2085044334"/>
-      </p:ext>
-    </p:extLst>
-  </p:cSld>
-  <p:clrMapOvr>
-    <a:masterClrMapping/>
-  </p:clrMapOvr>
-</p:sld>
-</file>
-
-<file path=ppt/slides/slide9.xml><?xml version="1.0" encoding="utf-8"?>
-<p:sld xmlns:a="http://schemas.openxmlformats.org/drawingml/2006/main" xmlns:r="http://schemas.openxmlformats.org/officeDocument/2006/relationships" xmlns:p="http://schemas.openxmlformats.org/presentationml/2006/main">
-  <p:cSld>
-    <p:spTree>
-      <p:nvGrpSpPr>
-        <p:cNvPr id="1" name=""/>
-        <p:cNvGrpSpPr/>
-        <p:nvPr/>
-      </p:nvGrpSpPr>
-      <p:grpSpPr>
-        <a:xfrm>
-          <a:off x="0" y="0"/>
-          <a:ext cx="0" cy="0"/>
-          <a:chOff x="0" y="0"/>
-          <a:chExt cx="0" cy="0"/>
-        </a:xfrm>
-      </p:grpSpPr>
-      <p:sp>
-        <p:nvSpPr>
-          <p:cNvPr id="2" name="제목 1">
-            <a:extLst>
-              <a:ext uri="{FF2B5EF4-FFF2-40B4-BE49-F238E27FC236}">
-                <a16:creationId xmlns:a16="http://schemas.microsoft.com/office/drawing/2014/main" id="{D02F4BC7-B151-78FA-57B6-099E8C5A4D5D}"/>
-              </a:ext>
-            </a:extLst>
-          </p:cNvPr>
-          <p:cNvSpPr>
-            <a:spLocks noGrp="1"/>
-          </p:cNvSpPr>
-          <p:nvPr>
-            <p:ph type="title"/>
-          </p:nvPr>
-        </p:nvSpPr>
-        <p:spPr/>
-        <p:txBody>
-          <a:bodyPr/>
-          <a:lstStyle/>
-          <a:p>
-            <a:r>
-              <a:rPr lang="en-US" altLang="ko-KR" dirty="0"/>
-              <a:t>*.AWL</a:t>
-            </a:r>
-            <a:endParaRPr lang="ko-KR" altLang="en-US" dirty="0"/>
-          </a:p>
-        </p:txBody>
-      </p:sp>
-      <p:sp>
-        <p:nvSpPr>
-          <p:cNvPr id="3" name="내용 개체 틀 2">
-            <a:extLst>
-              <a:ext uri="{FF2B5EF4-FFF2-40B4-BE49-F238E27FC236}">
-                <a16:creationId xmlns:a16="http://schemas.microsoft.com/office/drawing/2014/main" id="{99A31B4C-85A9-B7B5-F302-759A681EB5AC}"/>
-              </a:ext>
-            </a:extLst>
-          </p:cNvPr>
-          <p:cNvSpPr>
-            <a:spLocks noGrp="1"/>
-          </p:cNvSpPr>
-          <p:nvPr>
-            <p:ph idx="1"/>
-          </p:nvPr>
-        </p:nvSpPr>
-        <p:spPr>
-          <a:xfrm>
-            <a:off x="5754848" y="1825625"/>
-            <a:ext cx="5598952" cy="4351338"/>
-          </a:xfrm>
-        </p:spPr>
-        <p:txBody>
-          <a:bodyPr/>
-          <a:lstStyle/>
-          <a:p>
-            <a:r>
-              <a:rPr lang="en-US" altLang="ko-KR" dirty="0"/>
-              <a:t>DATA_BLOCK*</a:t>
-            </a:r>
-          </a:p>
-          <a:p>
-            <a:pPr lvl="1"/>
-            <a:r>
-              <a:rPr lang="en-US" altLang="ko-KR" dirty="0"/>
-              <a:t>STRUCT (recursive)</a:t>
-            </a:r>
-          </a:p>
-          <a:p>
-            <a:pPr lvl="1"/>
-            <a:r>
-              <a:rPr lang="en-US" altLang="ko-KR" dirty="0"/>
-              <a:t>BEGIN</a:t>
-            </a:r>
-          </a:p>
-          <a:p>
-            <a:r>
-              <a:rPr lang="en-US" altLang="ko-KR" dirty="0"/>
-              <a:t>ORGANIZATION_BLOCK*</a:t>
-            </a:r>
-          </a:p>
-          <a:p>
-            <a:pPr lvl="1"/>
-            <a:r>
-              <a:rPr lang="en-US" altLang="ko-KR" dirty="0"/>
-              <a:t>VAR_TEMP</a:t>
-            </a:r>
-          </a:p>
-          <a:p>
-            <a:pPr lvl="1"/>
-            <a:r>
-              <a:rPr lang="en-US" altLang="ko-KR" dirty="0"/>
-              <a:t>BEGIN</a:t>
-            </a:r>
-          </a:p>
-          <a:p>
-            <a:pPr lvl="1"/>
-            <a:r>
-              <a:rPr lang="en-US" altLang="ko-KR" dirty="0"/>
-              <a:t>NETWORK*</a:t>
-            </a:r>
-          </a:p>
-          <a:p>
-            <a:r>
-              <a:rPr lang="en-US" altLang="ko-KR" dirty="0"/>
-              <a:t>END_ORGANIZATION_BLOCK</a:t>
-            </a:r>
-            <a:endParaRPr lang="ko-KR" altLang="en-US" dirty="0"/>
-          </a:p>
-        </p:txBody>
-      </p:sp>
-      <p:sp>
-        <p:nvSpPr>
-          <p:cNvPr id="5" name="TextBox 4">
-            <a:extLst>
-              <a:ext uri="{FF2B5EF4-FFF2-40B4-BE49-F238E27FC236}">
-                <a16:creationId xmlns:a16="http://schemas.microsoft.com/office/drawing/2014/main" id="{C96FAB11-F64F-BED8-19E0-B2073F72A9B5}"/>
-              </a:ext>
-            </a:extLst>
-          </p:cNvPr>
-          <p:cNvSpPr txBox="1"/>
-          <p:nvPr/>
-        </p:nvSpPr>
-        <p:spPr>
-          <a:xfrm>
-            <a:off x="838200" y="1341795"/>
-            <a:ext cx="2811011" cy="4862870"/>
-          </a:xfrm>
-          <a:prstGeom prst="rect">
-            <a:avLst/>
-          </a:prstGeom>
-          <a:noFill/>
-        </p:spPr>
-        <p:txBody>
-          <a:bodyPr wrap="square">
-            <a:spAutoFit/>
-          </a:bodyPr>
-          <a:lstStyle/>
-          <a:p>
-            <a:r>
-              <a:rPr lang="en-US" altLang="ko-KR" sz="1000" dirty="0"/>
-              <a:t>DATA_BLOCK DB 1</a:t>
-            </a:r>
-          </a:p>
-          <a:p>
-            <a:r>
-              <a:rPr lang="en-US" altLang="ko-KR" sz="1000" dirty="0"/>
-              <a:t>TITLE =</a:t>
-            </a:r>
-          </a:p>
-          <a:p>
-            <a:r>
-              <a:rPr lang="en-US" altLang="ko-KR" sz="1000" dirty="0"/>
-              <a:t>VERSION : 0.1</a:t>
-            </a:r>
-          </a:p>
-          <a:p>
-            <a:endParaRPr lang="en-US" altLang="ko-KR" sz="1000" dirty="0"/>
-          </a:p>
-          <a:p>
-            <a:endParaRPr lang="en-US" altLang="ko-KR" sz="1000" dirty="0"/>
-          </a:p>
-          <a:p>
-            <a:r>
-              <a:rPr lang="en-US" altLang="ko-KR" sz="1000" dirty="0"/>
-              <a:t>  STRUCT 	</a:t>
-            </a:r>
-          </a:p>
-          <a:p>
-            <a:r>
-              <a:rPr lang="en-US" altLang="ko-KR" sz="1000" dirty="0"/>
-              <a:t>   BUFF : STRUCT 	//Temporary</a:t>
-            </a:r>
-          </a:p>
-          <a:p>
-            <a:r>
-              <a:rPr lang="en-US" altLang="ko-KR" sz="1000" dirty="0"/>
-              <a:t>    CAR_TYPE : WORD ;	</a:t>
-            </a:r>
-          </a:p>
-          <a:p>
-            <a:r>
-              <a:rPr lang="en-US" altLang="ko-KR" sz="1000" dirty="0"/>
-              <a:t>    C_NO : WORD ;	</a:t>
-            </a:r>
-          </a:p>
-          <a:p>
-            <a:r>
-              <a:rPr lang="en-US" altLang="ko-KR" sz="1000" dirty="0"/>
-              <a:t>    ROBOT : WORD ;	</a:t>
-            </a:r>
-          </a:p>
-          <a:p>
-            <a:r>
-              <a:rPr lang="en-US" altLang="ko-KR" sz="1000" dirty="0"/>
-              <a:t>    PROFILE : WORD ;	</a:t>
-            </a:r>
-          </a:p>
-          <a:p>
-            <a:r>
-              <a:rPr lang="en-US" altLang="ko-KR" sz="1000" dirty="0"/>
-              <a:t>    VIN_1 : WORD ;	</a:t>
-            </a:r>
-          </a:p>
-          <a:p>
-            <a:r>
-              <a:rPr lang="en-US" altLang="ko-KR" sz="1000" dirty="0"/>
-              <a:t>    VIN_2 : WORD ;	</a:t>
-            </a:r>
-          </a:p>
-          <a:p>
-            <a:r>
-              <a:rPr lang="en-US" altLang="ko-KR" sz="1000" dirty="0"/>
-              <a:t>    VIN_3 : WORD ;	</a:t>
-            </a:r>
-          </a:p>
-          <a:p>
-            <a:r>
-              <a:rPr lang="en-US" altLang="ko-KR" sz="1000" dirty="0"/>
-              <a:t>    VIN_4 : WORD ;	</a:t>
-            </a:r>
-          </a:p>
-          <a:p>
-            <a:r>
-              <a:rPr lang="en-US" altLang="ko-KR" sz="1000" dirty="0"/>
-              <a:t>    VIN_5 : WORD ;	</a:t>
-            </a:r>
-          </a:p>
-          <a:p>
-            <a:r>
-              <a:rPr lang="en-US" altLang="ko-KR" sz="1000" dirty="0"/>
-              <a:t>    VIN_6 : WORD ;	</a:t>
-            </a:r>
-          </a:p>
-          <a:p>
-            <a:r>
-              <a:rPr lang="en-US" altLang="ko-KR" sz="1000" dirty="0"/>
-              <a:t>   END_STRUCT ;	</a:t>
-            </a:r>
-          </a:p>
-          <a:p>
-            <a:r>
-              <a:rPr lang="en-US" altLang="ko-KR" sz="1000" dirty="0"/>
-              <a:t>   S171 : STRUCT 	//Temporary</a:t>
-            </a:r>
-          </a:p>
-          <a:p>
-            <a:r>
-              <a:rPr lang="en-US" altLang="ko-KR" sz="1000" dirty="0"/>
-              <a:t>    CAR_TYPE : WORD ;	</a:t>
-            </a:r>
-          </a:p>
-          <a:p>
-            <a:r>
-              <a:rPr lang="en-US" altLang="ko-KR" sz="1000" dirty="0"/>
-              <a:t>    C_NO : WORD ;	</a:t>
-            </a:r>
-          </a:p>
-          <a:p>
-            <a:r>
-              <a:rPr lang="en-US" altLang="ko-KR" sz="1000" dirty="0"/>
-              <a:t>    ROBOT : WORD ;	</a:t>
-            </a:r>
-          </a:p>
-          <a:p>
-            <a:r>
-              <a:rPr lang="en-US" altLang="ko-KR" sz="1000" dirty="0"/>
-              <a:t>    PROFILE : WORD ;	</a:t>
-            </a:r>
-          </a:p>
-          <a:p>
-            <a:r>
-              <a:rPr lang="en-US" altLang="ko-KR" sz="1000" dirty="0"/>
-              <a:t>    VIN_1 : WORD ;	</a:t>
-            </a:r>
-          </a:p>
-          <a:p>
-            <a:r>
-              <a:rPr lang="en-US" altLang="ko-KR" sz="1000" dirty="0"/>
-              <a:t>    VIN_2 : WORD ;	</a:t>
-            </a:r>
-          </a:p>
-          <a:p>
-            <a:r>
-              <a:rPr lang="en-US" altLang="ko-KR" sz="1000" dirty="0"/>
-              <a:t>    VIN_3 : WORD ;	</a:t>
-            </a:r>
-          </a:p>
-          <a:p>
-            <a:r>
-              <a:rPr lang="en-US" altLang="ko-KR" sz="1000" dirty="0"/>
-              <a:t>    VIN_4 : WORD ;	</a:t>
-            </a:r>
-          </a:p>
-          <a:p>
-            <a:r>
-              <a:rPr lang="en-US" altLang="ko-KR" sz="1000" dirty="0"/>
-              <a:t>    VIN_5 : WORD ;	</a:t>
-            </a:r>
-          </a:p>
-          <a:p>
-            <a:r>
-              <a:rPr lang="en-US" altLang="ko-KR" sz="1000" dirty="0"/>
-              <a:t>    VIN_6 : WORD ;	</a:t>
-            </a:r>
-          </a:p>
-          <a:p>
-            <a:r>
-              <a:rPr lang="en-US" altLang="ko-KR" sz="1000" dirty="0"/>
-              <a:t>   END_STRUCT ;	</a:t>
-            </a:r>
-          </a:p>
-          <a:p>
-            <a:r>
-              <a:rPr lang="en-US" altLang="ko-KR" sz="1000" dirty="0"/>
-              <a:t> </a:t>
-            </a:r>
-            <a:endParaRPr lang="ko-KR" altLang="en-US" sz="1000" dirty="0"/>
-          </a:p>
-        </p:txBody>
-      </p:sp>
-      <p:sp>
-        <p:nvSpPr>
-          <p:cNvPr id="7" name="TextBox 6">
-            <a:extLst>
-              <a:ext uri="{FF2B5EF4-FFF2-40B4-BE49-F238E27FC236}">
-                <a16:creationId xmlns:a16="http://schemas.microsoft.com/office/drawing/2014/main" id="{DA9945B1-50D5-1D85-8EBA-AFA1B3B531F8}"/>
-              </a:ext>
-            </a:extLst>
-          </p:cNvPr>
-          <p:cNvSpPr txBox="1"/>
-          <p:nvPr/>
-        </p:nvSpPr>
-        <p:spPr>
-          <a:xfrm>
-            <a:off x="492632" y="6311900"/>
-            <a:ext cx="9456039" cy="369332"/>
-          </a:xfrm>
-          <a:prstGeom prst="rect">
-            <a:avLst/>
-          </a:prstGeom>
-          <a:noFill/>
-        </p:spPr>
-        <p:txBody>
-          <a:bodyPr wrap="square">
-            <a:spAutoFit/>
-          </a:bodyPr>
-          <a:lstStyle/>
-          <a:p>
-            <a:r>
-              <a:rPr lang="ko-KR" altLang="en-US" dirty="0"/>
-              <a:t>https://cache.industry.siemens.com/dl/files/446/45523446/att_79269/v1/s7awl__b.pdf</a:t>
-            </a:r>
-          </a:p>
-        </p:txBody>
-      </p:sp>
-    </p:spTree>
-    <p:custDataLst>
-      <p:tags r:id="rId1"/>
-    </p:custDataLst>
-    <p:extLst>
-      <p:ext uri="{BB962C8B-B14F-4D97-AF65-F5344CB8AC3E}">
-        <p14:creationId xmlns:p14="http://schemas.microsoft.com/office/powerpoint/2010/main" val="522148683"/>
       </p:ext>
     </p:extLst>
   </p:cSld>
@@ -10002,6 +10103,12 @@
 </file>
 
 <file path=ppt/tags/tag32.xml><?xml version="1.0" encoding="utf-8"?>
+<p:tagLst xmlns:a="http://schemas.openxmlformats.org/drawingml/2006/main" xmlns:r="http://schemas.openxmlformats.org/officeDocument/2006/relationships" xmlns:p="http://schemas.openxmlformats.org/presentationml/2006/main">
+  <p:tag name="PROPSLIDE" val="{&#10;  &quot;UseMacroExapnsion&quot;: false,&#10;  &quot;MacroExpansions&quot;: {}&#10;}"/>
+</p:tagLst>
+</file>
+
+<file path=ppt/tags/tag33.xml><?xml version="1.0" encoding="utf-8"?>
 <p:tagLst xmlns:a="http://schemas.openxmlformats.org/drawingml/2006/main" xmlns:r="http://schemas.openxmlformats.org/officeDocument/2006/relationships" xmlns:p="http://schemas.openxmlformats.org/presentationml/2006/main">
   <p:tag name="PROPSLIDE" val="{&#10;  &quot;UseMacroExapnsion&quot;: false,&#10;  &quot;MacroExpansions&quot;: {}&#10;}"/>
 </p:tagLst>

</xml_diff>